<commit_message>
updated per Adeel's comments
</commit_message>
<xml_diff>
--- a/Slides/Module 05 Interaction-Level Design Patterns.pptx
+++ b/Slides/Module 05 Interaction-Level Design Patterns.pptx
@@ -234,6 +234,14 @@
     </p:ext>
   </p:extLst>
 </p:presentation>
+</file>
+
+<file path=ppt/revisionInfo.xml><?xml version="1.0" encoding="utf-8"?>
+<p1510:revInfo xmlns:a="http://schemas.openxmlformats.org/drawingml/2006/main" xmlns:r="http://schemas.openxmlformats.org/officeDocument/2006/relationships" xmlns:p1510="http://schemas.microsoft.com/office/powerpoint/2015/10/main">
+  <p1510:revLst>
+    <p1510:client id="{8C92D9B1-57F9-4FA7-AF99-4475187A1412}" v="1" dt="2024-01-21T17:06:38.657"/>
+  </p1510:revLst>
+</p1510:revInfo>
 </file>
 
 <file path=ppt/changesInfos/changesInfo1.xml><?xml version="1.0" encoding="utf-8"?>
@@ -587,6 +595,22 @@
     </pc:docChg>
   </pc:docChgLst>
   <pc:docChgLst>
+    <pc:chgData name="Mitchell Wand" userId="de9b44c55c049659" providerId="LiveId" clId="{4A973BDD-CE3E-44C6-9EDF-D54C4EF6B1EE}"/>
+    <pc:docChg chg="modSld">
+      <pc:chgData name="Mitchell Wand" userId="de9b44c55c049659" providerId="LiveId" clId="{4A973BDD-CE3E-44C6-9EDF-D54C4EF6B1EE}" dt="2024-01-12T03:29:52.460" v="1" actId="20577"/>
+      <pc:docMkLst>
+        <pc:docMk/>
+      </pc:docMkLst>
+      <pc:sldChg chg="modNotesTx">
+        <pc:chgData name="Mitchell Wand" userId="de9b44c55c049659" providerId="LiveId" clId="{4A973BDD-CE3E-44C6-9EDF-D54C4EF6B1EE}" dt="2024-01-12T03:29:52.460" v="1" actId="20577"/>
+        <pc:sldMkLst>
+          <pc:docMk/>
+          <pc:sldMk cId="3025610200" sldId="485"/>
+        </pc:sldMkLst>
+      </pc:sldChg>
+    </pc:docChg>
+  </pc:docChgLst>
+  <pc:docChgLst>
     <pc:chgData name="Mitchell Wand" userId="de9b44c55c049659" providerId="LiveId" clId="{FD479DE8-776B-41E8-8926-09AF8891AAED}"/>
     <pc:docChg chg="custSel modSld">
       <pc:chgData name="Mitchell Wand" userId="de9b44c55c049659" providerId="LiveId" clId="{FD479DE8-776B-41E8-8926-09AF8891AAED}" dt="2022-09-14T00:02:04.740" v="405" actId="20577"/>
@@ -638,574 +662,6 @@
             <ac:picMk id="7" creationId="{FBFF9F06-9915-E65A-72F0-B1C57D7B1F81}"/>
           </ac:picMkLst>
         </pc:picChg>
-      </pc:sldChg>
-    </pc:docChg>
-  </pc:docChgLst>
-  <pc:docChgLst>
-    <pc:chgData name="Mitchell Wand" userId="de9b44c55c049659" providerId="LiveId" clId="{EC2E571C-5A66-449C-9EE1-49309F33B3B5}"/>
-    <pc:docChg chg="custSel addSld delSld modSld modSection">
-      <pc:chgData name="Mitchell Wand" userId="de9b44c55c049659" providerId="LiveId" clId="{EC2E571C-5A66-449C-9EE1-49309F33B3B5}" dt="2022-09-20T02:16:55.941" v="686" actId="47"/>
-      <pc:docMkLst>
-        <pc:docMk/>
-      </pc:docMkLst>
-      <pc:sldChg chg="del">
-        <pc:chgData name="Mitchell Wand" userId="de9b44c55c049659" providerId="LiveId" clId="{EC2E571C-5A66-449C-9EE1-49309F33B3B5}" dt="2022-09-20T02:16:55.941" v="686" actId="47"/>
-        <pc:sldMkLst>
-          <pc:docMk/>
-          <pc:sldMk cId="460746757" sldId="378"/>
-        </pc:sldMkLst>
-      </pc:sldChg>
-      <pc:sldChg chg="del">
-        <pc:chgData name="Mitchell Wand" userId="de9b44c55c049659" providerId="LiveId" clId="{EC2E571C-5A66-449C-9EE1-49309F33B3B5}" dt="2022-09-20T02:16:55.941" v="686" actId="47"/>
-        <pc:sldMkLst>
-          <pc:docMk/>
-          <pc:sldMk cId="1550252733" sldId="379"/>
-        </pc:sldMkLst>
-      </pc:sldChg>
-      <pc:sldChg chg="del">
-        <pc:chgData name="Mitchell Wand" userId="de9b44c55c049659" providerId="LiveId" clId="{EC2E571C-5A66-449C-9EE1-49309F33B3B5}" dt="2022-09-20T02:16:55.941" v="686" actId="47"/>
-        <pc:sldMkLst>
-          <pc:docMk/>
-          <pc:sldMk cId="1567996913" sldId="380"/>
-        </pc:sldMkLst>
-      </pc:sldChg>
-      <pc:sldChg chg="del">
-        <pc:chgData name="Mitchell Wand" userId="de9b44c55c049659" providerId="LiveId" clId="{EC2E571C-5A66-449C-9EE1-49309F33B3B5}" dt="2022-09-20T02:16:55.941" v="686" actId="47"/>
-        <pc:sldMkLst>
-          <pc:docMk/>
-          <pc:sldMk cId="3293054105" sldId="406"/>
-        </pc:sldMkLst>
-      </pc:sldChg>
-      <pc:sldChg chg="addSp delSp modSp mod">
-        <pc:chgData name="Mitchell Wand" userId="de9b44c55c049659" providerId="LiveId" clId="{EC2E571C-5A66-449C-9EE1-49309F33B3B5}" dt="2022-09-16T19:29:15.074" v="331" actId="313"/>
-        <pc:sldMkLst>
-          <pc:docMk/>
-          <pc:sldMk cId="1614679311" sldId="435"/>
-        </pc:sldMkLst>
-        <pc:spChg chg="add del mod">
-          <ac:chgData name="Mitchell Wand" userId="de9b44c55c049659" providerId="LiveId" clId="{EC2E571C-5A66-449C-9EE1-49309F33B3B5}" dt="2022-09-16T19:28:26.915" v="218" actId="478"/>
-          <ac:spMkLst>
-            <pc:docMk/>
-            <pc:sldMk cId="1614679311" sldId="435"/>
-            <ac:spMk id="5" creationId="{AC4BE03E-1DFA-D446-D967-7CEDFCBF232F}"/>
-          </ac:spMkLst>
-        </pc:spChg>
-        <pc:spChg chg="add mod">
-          <ac:chgData name="Mitchell Wand" userId="de9b44c55c049659" providerId="LiveId" clId="{EC2E571C-5A66-449C-9EE1-49309F33B3B5}" dt="2022-09-16T19:29:15.074" v="331" actId="313"/>
-          <ac:spMkLst>
-            <pc:docMk/>
-            <pc:sldMk cId="1614679311" sldId="435"/>
-            <ac:spMk id="6" creationId="{19E251ED-E8E3-1106-3E22-8A8B1249E56D}"/>
-          </ac:spMkLst>
-        </pc:spChg>
-      </pc:sldChg>
-      <pc:sldChg chg="addSp delSp modSp mod modNotesTx">
-        <pc:chgData name="Mitchell Wand" userId="de9b44c55c049659" providerId="LiveId" clId="{EC2E571C-5A66-449C-9EE1-49309F33B3B5}" dt="2022-09-16T19:24:06.417" v="192" actId="1076"/>
-        <pc:sldMkLst>
-          <pc:docMk/>
-          <pc:sldMk cId="800228832" sldId="447"/>
-        </pc:sldMkLst>
-        <pc:spChg chg="add del mod">
-          <ac:chgData name="Mitchell Wand" userId="de9b44c55c049659" providerId="LiveId" clId="{EC2E571C-5A66-449C-9EE1-49309F33B3B5}" dt="2022-09-16T19:23:57.499" v="191" actId="478"/>
-          <ac:spMkLst>
-            <pc:docMk/>
-            <pc:sldMk cId="800228832" sldId="447"/>
-            <ac:spMk id="3" creationId="{17C3B57C-7D1C-1CB3-6D46-1BE2F9AA0D80}"/>
-          </ac:spMkLst>
-        </pc:spChg>
-        <pc:spChg chg="add mod">
-          <ac:chgData name="Mitchell Wand" userId="de9b44c55c049659" providerId="LiveId" clId="{EC2E571C-5A66-449C-9EE1-49309F33B3B5}" dt="2022-09-16T19:24:06.417" v="192" actId="1076"/>
-          <ac:spMkLst>
-            <pc:docMk/>
-            <pc:sldMk cId="800228832" sldId="447"/>
-            <ac:spMk id="5" creationId="{2D583A18-EB37-2C64-291E-115AD64B280D}"/>
-          </ac:spMkLst>
-        </pc:spChg>
-        <pc:spChg chg="mod">
-          <ac:chgData name="Mitchell Wand" userId="de9b44c55c049659" providerId="LiveId" clId="{EC2E571C-5A66-449C-9EE1-49309F33B3B5}" dt="2022-09-16T19:18:06.247" v="177" actId="20577"/>
-          <ac:spMkLst>
-            <pc:docMk/>
-            <pc:sldMk cId="800228832" sldId="447"/>
-            <ac:spMk id="11" creationId="{499C7BCB-BC9D-4BD1-B8B1-463CDCFDE915}"/>
-          </ac:spMkLst>
-        </pc:spChg>
-      </pc:sldChg>
-      <pc:sldChg chg="del">
-        <pc:chgData name="Mitchell Wand" userId="de9b44c55c049659" providerId="LiveId" clId="{EC2E571C-5A66-449C-9EE1-49309F33B3B5}" dt="2022-09-16T19:43:28.041" v="619" actId="2696"/>
-        <pc:sldMkLst>
-          <pc:docMk/>
-          <pc:sldMk cId="2911925200" sldId="448"/>
-        </pc:sldMkLst>
-      </pc:sldChg>
-      <pc:sldChg chg="addSp modSp mod">
-        <pc:chgData name="Mitchell Wand" userId="de9b44c55c049659" providerId="LiveId" clId="{EC2E571C-5A66-449C-9EE1-49309F33B3B5}" dt="2022-09-16T19:36:45.191" v="478" actId="20577"/>
-        <pc:sldMkLst>
-          <pc:docMk/>
-          <pc:sldMk cId="1750428041" sldId="457"/>
-        </pc:sldMkLst>
-        <pc:spChg chg="add mod">
-          <ac:chgData name="Mitchell Wand" userId="de9b44c55c049659" providerId="LiveId" clId="{EC2E571C-5A66-449C-9EE1-49309F33B3B5}" dt="2022-09-16T19:36:45.191" v="478" actId="20577"/>
-          <ac:spMkLst>
-            <pc:docMk/>
-            <pc:sldMk cId="1750428041" sldId="457"/>
-            <ac:spMk id="2" creationId="{60B656AB-4242-0551-47E0-F723B829CA79}"/>
-          </ac:spMkLst>
-        </pc:spChg>
-        <pc:spChg chg="mod">
-          <ac:chgData name="Mitchell Wand" userId="de9b44c55c049659" providerId="LiveId" clId="{EC2E571C-5A66-449C-9EE1-49309F33B3B5}" dt="2022-09-16T19:36:22.235" v="461" actId="20577"/>
-          <ac:spMkLst>
-            <pc:docMk/>
-            <pc:sldMk cId="1750428041" sldId="457"/>
-            <ac:spMk id="5" creationId="{7155BEF8-786F-4A11-92EC-982C8864DEC9}"/>
-          </ac:spMkLst>
-        </pc:spChg>
-        <pc:spChg chg="mod">
-          <ac:chgData name="Mitchell Wand" userId="de9b44c55c049659" providerId="LiveId" clId="{EC2E571C-5A66-449C-9EE1-49309F33B3B5}" dt="2022-09-16T19:32:51.898" v="356" actId="14100"/>
-          <ac:spMkLst>
-            <pc:docMk/>
-            <pc:sldMk cId="1750428041" sldId="457"/>
-            <ac:spMk id="8" creationId="{8EA2192A-AD62-4EFB-9689-FF1EAF81C86C}"/>
-          </ac:spMkLst>
-        </pc:spChg>
-      </pc:sldChg>
-      <pc:sldChg chg="addSp delSp modSp mod delAnim">
-        <pc:chgData name="Mitchell Wand" userId="de9b44c55c049659" providerId="LiveId" clId="{EC2E571C-5A66-449C-9EE1-49309F33B3B5}" dt="2022-09-16T19:40:05.537" v="571" actId="20577"/>
-        <pc:sldMkLst>
-          <pc:docMk/>
-          <pc:sldMk cId="152966388" sldId="458"/>
-        </pc:sldMkLst>
-        <pc:spChg chg="add mod">
-          <ac:chgData name="Mitchell Wand" userId="de9b44c55c049659" providerId="LiveId" clId="{EC2E571C-5A66-449C-9EE1-49309F33B3B5}" dt="2022-09-16T19:40:05.537" v="571" actId="20577"/>
-          <ac:spMkLst>
-            <pc:docMk/>
-            <pc:sldMk cId="152966388" sldId="458"/>
-            <ac:spMk id="3" creationId="{5AC96520-B8C4-796E-18FA-D95CA5394859}"/>
-          </ac:spMkLst>
-        </pc:spChg>
-        <pc:spChg chg="add mod">
-          <ac:chgData name="Mitchell Wand" userId="de9b44c55c049659" providerId="LiveId" clId="{EC2E571C-5A66-449C-9EE1-49309F33B3B5}" dt="2022-09-16T19:39:43.203" v="566" actId="1076"/>
-          <ac:spMkLst>
-            <pc:docMk/>
-            <pc:sldMk cId="152966388" sldId="458"/>
-            <ac:spMk id="5" creationId="{831547E0-8745-0296-3E34-5C36244F2E82}"/>
-          </ac:spMkLst>
-        </pc:spChg>
-        <pc:spChg chg="mod">
-          <ac:chgData name="Mitchell Wand" userId="de9b44c55c049659" providerId="LiveId" clId="{EC2E571C-5A66-449C-9EE1-49309F33B3B5}" dt="2022-09-16T19:33:18.959" v="363" actId="20577"/>
-          <ac:spMkLst>
-            <pc:docMk/>
-            <pc:sldMk cId="152966388" sldId="458"/>
-            <ac:spMk id="6" creationId="{14EA479B-1118-49C6-B718-DB9189AC9DA4}"/>
-          </ac:spMkLst>
-        </pc:spChg>
-        <pc:spChg chg="del mod">
-          <ac:chgData name="Mitchell Wand" userId="de9b44c55c049659" providerId="LiveId" clId="{EC2E571C-5A66-449C-9EE1-49309F33B3B5}" dt="2022-09-16T19:38:26.308" v="503" actId="478"/>
-          <ac:spMkLst>
-            <pc:docMk/>
-            <pc:sldMk cId="152966388" sldId="458"/>
-            <ac:spMk id="7" creationId="{08DBB5C8-71A8-4040-840C-6B42DA072E84}"/>
-          </ac:spMkLst>
-        </pc:spChg>
-        <pc:spChg chg="del">
-          <ac:chgData name="Mitchell Wand" userId="de9b44c55c049659" providerId="LiveId" clId="{EC2E571C-5A66-449C-9EE1-49309F33B3B5}" dt="2022-09-16T19:38:27.828" v="504" actId="478"/>
-          <ac:spMkLst>
-            <pc:docMk/>
-            <pc:sldMk cId="152966388" sldId="458"/>
-            <ac:spMk id="8" creationId="{9C9F3FE7-3D06-467F-9E42-2B570A18A275}"/>
-          </ac:spMkLst>
-        </pc:spChg>
-        <pc:spChg chg="add mod">
-          <ac:chgData name="Mitchell Wand" userId="de9b44c55c049659" providerId="LiveId" clId="{EC2E571C-5A66-449C-9EE1-49309F33B3B5}" dt="2022-09-16T19:39:48.838" v="567" actId="1076"/>
-          <ac:spMkLst>
-            <pc:docMk/>
-            <pc:sldMk cId="152966388" sldId="458"/>
-            <ac:spMk id="9" creationId="{81B12048-2355-7B79-BF56-1A6431BF14F8}"/>
-          </ac:spMkLst>
-        </pc:spChg>
-      </pc:sldChg>
-      <pc:sldChg chg="del">
-        <pc:chgData name="Mitchell Wand" userId="de9b44c55c049659" providerId="LiveId" clId="{EC2E571C-5A66-449C-9EE1-49309F33B3B5}" dt="2022-09-16T19:40:29.782" v="572" actId="2696"/>
-        <pc:sldMkLst>
-          <pc:docMk/>
-          <pc:sldMk cId="3014336577" sldId="459"/>
-        </pc:sldMkLst>
-      </pc:sldChg>
-      <pc:sldChg chg="addSp delSp modSp mod delAnim">
-        <pc:chgData name="Mitchell Wand" userId="de9b44c55c049659" providerId="LiveId" clId="{EC2E571C-5A66-449C-9EE1-49309F33B3B5}" dt="2022-09-16T19:42:33.781" v="617" actId="20577"/>
-        <pc:sldMkLst>
-          <pc:docMk/>
-          <pc:sldMk cId="1471926169" sldId="460"/>
-        </pc:sldMkLst>
-        <pc:spChg chg="mod">
-          <ac:chgData name="Mitchell Wand" userId="de9b44c55c049659" providerId="LiveId" clId="{EC2E571C-5A66-449C-9EE1-49309F33B3B5}" dt="2022-09-16T19:42:33.781" v="617" actId="20577"/>
-          <ac:spMkLst>
-            <pc:docMk/>
-            <pc:sldMk cId="1471926169" sldId="460"/>
-            <ac:spMk id="2" creationId="{FE36DEDC-D4E3-4C9B-933B-A38B72F2F79D}"/>
-          </ac:spMkLst>
-        </pc:spChg>
-        <pc:spChg chg="add mod">
-          <ac:chgData name="Mitchell Wand" userId="de9b44c55c049659" providerId="LiveId" clId="{EC2E571C-5A66-449C-9EE1-49309F33B3B5}" dt="2022-09-16T19:41:42.179" v="583" actId="1076"/>
-          <ac:spMkLst>
-            <pc:docMk/>
-            <pc:sldMk cId="1471926169" sldId="460"/>
-            <ac:spMk id="3" creationId="{F4A56094-3F41-A93D-8604-EB2C5109B119}"/>
-          </ac:spMkLst>
-        </pc:spChg>
-        <pc:spChg chg="mod">
-          <ac:chgData name="Mitchell Wand" userId="de9b44c55c049659" providerId="LiveId" clId="{EC2E571C-5A66-449C-9EE1-49309F33B3B5}" dt="2022-09-16T19:42:13.037" v="585" actId="1076"/>
-          <ac:spMkLst>
-            <pc:docMk/>
-            <pc:sldMk cId="1471926169" sldId="460"/>
-            <ac:spMk id="6" creationId="{914F242F-B894-4E59-A219-59B9174F3CB3}"/>
-          </ac:spMkLst>
-        </pc:spChg>
-        <pc:spChg chg="del">
-          <ac:chgData name="Mitchell Wand" userId="de9b44c55c049659" providerId="LiveId" clId="{EC2E571C-5A66-449C-9EE1-49309F33B3B5}" dt="2022-09-16T19:41:32.012" v="581" actId="478"/>
-          <ac:spMkLst>
-            <pc:docMk/>
-            <pc:sldMk cId="1471926169" sldId="460"/>
-            <ac:spMk id="7" creationId="{6175C8DB-FF27-493F-9D79-8F4CDEADD4CC}"/>
-          </ac:spMkLst>
-        </pc:spChg>
-      </pc:sldChg>
-      <pc:sldChg chg="del">
-        <pc:chgData name="Mitchell Wand" userId="de9b44c55c049659" providerId="LiveId" clId="{EC2E571C-5A66-449C-9EE1-49309F33B3B5}" dt="2022-09-16T18:59:45.093" v="1" actId="2696"/>
-        <pc:sldMkLst>
-          <pc:docMk/>
-          <pc:sldMk cId="3988182231" sldId="487"/>
-        </pc:sldMkLst>
-      </pc:sldChg>
-      <pc:sldChg chg="addSp modSp mod">
-        <pc:chgData name="Mitchell Wand" userId="de9b44c55c049659" providerId="LiveId" clId="{EC2E571C-5A66-449C-9EE1-49309F33B3B5}" dt="2022-09-16T19:24:56.350" v="212" actId="20577"/>
-        <pc:sldMkLst>
-          <pc:docMk/>
-          <pc:sldMk cId="84402381" sldId="488"/>
-        </pc:sldMkLst>
-        <pc:spChg chg="add mod">
-          <ac:chgData name="Mitchell Wand" userId="de9b44c55c049659" providerId="LiveId" clId="{EC2E571C-5A66-449C-9EE1-49309F33B3B5}" dt="2022-09-16T19:24:18.873" v="197" actId="20577"/>
-          <ac:spMkLst>
-            <pc:docMk/>
-            <pc:sldMk cId="84402381" sldId="488"/>
-            <ac:spMk id="3" creationId="{6807ABB3-400B-5377-8373-242196443552}"/>
-          </ac:spMkLst>
-        </pc:spChg>
-        <pc:spChg chg="mod">
-          <ac:chgData name="Mitchell Wand" userId="de9b44c55c049659" providerId="LiveId" clId="{EC2E571C-5A66-449C-9EE1-49309F33B3B5}" dt="2022-09-16T19:24:56.350" v="212" actId="20577"/>
-          <ac:spMkLst>
-            <pc:docMk/>
-            <pc:sldMk cId="84402381" sldId="488"/>
-            <ac:spMk id="11" creationId="{499C7BCB-BC9D-4BD1-B8B1-463CDCFDE915}"/>
-          </ac:spMkLst>
-        </pc:spChg>
-      </pc:sldChg>
-      <pc:sldChg chg="modSp mod">
-        <pc:chgData name="Mitchell Wand" userId="de9b44c55c049659" providerId="LiveId" clId="{EC2E571C-5A66-449C-9EE1-49309F33B3B5}" dt="2022-09-16T19:01:28.744" v="150" actId="20577"/>
-        <pc:sldMkLst>
-          <pc:docMk/>
-          <pc:sldMk cId="2976171112" sldId="500"/>
-        </pc:sldMkLst>
-        <pc:spChg chg="mod">
-          <ac:chgData name="Mitchell Wand" userId="de9b44c55c049659" providerId="LiveId" clId="{EC2E571C-5A66-449C-9EE1-49309F33B3B5}" dt="2022-09-16T19:01:28.744" v="150" actId="20577"/>
-          <ac:spMkLst>
-            <pc:docMk/>
-            <pc:sldMk cId="2976171112" sldId="500"/>
-            <ac:spMk id="3" creationId="{5D7C592F-1F68-3262-275C-DAAE284725A7}"/>
-          </ac:spMkLst>
-        </pc:spChg>
-      </pc:sldChg>
-      <pc:sldChg chg="addSp delSp modSp mod">
-        <pc:chgData name="Mitchell Wand" userId="de9b44c55c049659" providerId="LiveId" clId="{EC2E571C-5A66-449C-9EE1-49309F33B3B5}" dt="2022-09-16T20:04:37.081" v="677" actId="1076"/>
-        <pc:sldMkLst>
-          <pc:docMk/>
-          <pc:sldMk cId="700069445" sldId="501"/>
-        </pc:sldMkLst>
-        <pc:spChg chg="add mod">
-          <ac:chgData name="Mitchell Wand" userId="de9b44c55c049659" providerId="LiveId" clId="{EC2E571C-5A66-449C-9EE1-49309F33B3B5}" dt="2022-09-16T20:04:37.081" v="677" actId="1076"/>
-          <ac:spMkLst>
-            <pc:docMk/>
-            <pc:sldMk cId="700069445" sldId="501"/>
-            <ac:spMk id="4" creationId="{DF6A7977-8F3E-578F-0410-B9988554EBC0}"/>
-          </ac:spMkLst>
-        </pc:spChg>
-        <pc:spChg chg="del">
-          <ac:chgData name="Mitchell Wand" userId="de9b44c55c049659" providerId="LiveId" clId="{EC2E571C-5A66-449C-9EE1-49309F33B3B5}" dt="2022-09-16T20:04:23.609" v="675" actId="478"/>
-          <ac:spMkLst>
-            <pc:docMk/>
-            <pc:sldMk cId="700069445" sldId="501"/>
-            <ac:spMk id="6" creationId="{C4A86ECB-3B1A-487B-9D78-68C1FB3C8902}"/>
-          </ac:spMkLst>
-        </pc:spChg>
-        <pc:spChg chg="mod">
-          <ac:chgData name="Mitchell Wand" userId="de9b44c55c049659" providerId="LiveId" clId="{EC2E571C-5A66-449C-9EE1-49309F33B3B5}" dt="2022-09-16T20:03:27.865" v="630" actId="20577"/>
-          <ac:spMkLst>
-            <pc:docMk/>
-            <pc:sldMk cId="700069445" sldId="501"/>
-            <ac:spMk id="8" creationId="{0FFEFE51-74B1-2646-A6E9-1832E8A6E76A}"/>
-          </ac:spMkLst>
-        </pc:spChg>
-      </pc:sldChg>
-      <pc:sldChg chg="modSp mod">
-        <pc:chgData name="Mitchell Wand" userId="de9b44c55c049659" providerId="LiveId" clId="{EC2E571C-5A66-449C-9EE1-49309F33B3B5}" dt="2022-09-16T20:06:22.052" v="685"/>
-        <pc:sldMkLst>
-          <pc:docMk/>
-          <pc:sldMk cId="2377701537" sldId="502"/>
-        </pc:sldMkLst>
-        <pc:spChg chg="mod">
-          <ac:chgData name="Mitchell Wand" userId="de9b44c55c049659" providerId="LiveId" clId="{EC2E571C-5A66-449C-9EE1-49309F33B3B5}" dt="2022-09-16T20:04:53.348" v="683" actId="20577"/>
-          <ac:spMkLst>
-            <pc:docMk/>
-            <pc:sldMk cId="2377701537" sldId="502"/>
-            <ac:spMk id="2" creationId="{4CEB8347-843E-21D6-8D6E-557555620D2C}"/>
-          </ac:spMkLst>
-        </pc:spChg>
-        <pc:spChg chg="mod">
-          <ac:chgData name="Mitchell Wand" userId="de9b44c55c049659" providerId="LiveId" clId="{EC2E571C-5A66-449C-9EE1-49309F33B3B5}" dt="2022-09-16T20:06:22.052" v="685"/>
-          <ac:spMkLst>
-            <pc:docMk/>
-            <pc:sldMk cId="2377701537" sldId="502"/>
-            <ac:spMk id="5" creationId="{67FCC827-28CD-0EDD-710E-CA98CE22E5CB}"/>
-          </ac:spMkLst>
-        </pc:spChg>
-      </pc:sldChg>
-      <pc:sldChg chg="del">
-        <pc:chgData name="Mitchell Wand" userId="de9b44c55c049659" providerId="LiveId" clId="{EC2E571C-5A66-449C-9EE1-49309F33B3B5}" dt="2022-09-20T02:16:55.941" v="686" actId="47"/>
-        <pc:sldMkLst>
-          <pc:docMk/>
-          <pc:sldMk cId="3753540932" sldId="503"/>
-        </pc:sldMkLst>
-      </pc:sldChg>
-      <pc:sldChg chg="add">
-        <pc:chgData name="Mitchell Wand" userId="de9b44c55c049659" providerId="LiveId" clId="{EC2E571C-5A66-449C-9EE1-49309F33B3B5}" dt="2022-09-16T18:59:40.797" v="0"/>
-        <pc:sldMkLst>
-          <pc:docMk/>
-          <pc:sldMk cId="1544083876" sldId="508"/>
-        </pc:sldMkLst>
-      </pc:sldChg>
-      <pc:sldChg chg="add">
-        <pc:chgData name="Mitchell Wand" userId="de9b44c55c049659" providerId="LiveId" clId="{EC2E571C-5A66-449C-9EE1-49309F33B3B5}" dt="2022-09-16T19:43:00.821" v="618"/>
-        <pc:sldMkLst>
-          <pc:docMk/>
-          <pc:sldMk cId="1210151535" sldId="509"/>
-        </pc:sldMkLst>
-      </pc:sldChg>
-      <pc:sldChg chg="modSp add del mod">
-        <pc:chgData name="Mitchell Wand" userId="de9b44c55c049659" providerId="LiveId" clId="{EC2E571C-5A66-449C-9EE1-49309F33B3B5}" dt="2022-09-16T19:01:35.550" v="151" actId="2696"/>
-        <pc:sldMkLst>
-          <pc:docMk/>
-          <pc:sldMk cId="2144624189" sldId="509"/>
-        </pc:sldMkLst>
-        <pc:spChg chg="mod">
-          <ac:chgData name="Mitchell Wand" userId="de9b44c55c049659" providerId="LiveId" clId="{EC2E571C-5A66-449C-9EE1-49309F33B3B5}" dt="2022-09-16T19:01:03.021" v="126" actId="21"/>
-          <ac:spMkLst>
-            <pc:docMk/>
-            <pc:sldMk cId="2144624189" sldId="509"/>
-            <ac:spMk id="3" creationId="{5D7C592F-1F68-3262-275C-DAAE284725A7}"/>
-          </ac:spMkLst>
-        </pc:spChg>
-      </pc:sldChg>
-    </pc:docChg>
-  </pc:docChgLst>
-  <pc:docChgLst>
-    <pc:chgData name="Mitchell Wand" userId="de9b44c55c049659" providerId="LiveId" clId="{9FFE94DE-F39B-477D-9C0B-6B69CE1D1F97}"/>
-    <pc:docChg chg="custSel modSld">
-      <pc:chgData name="Mitchell Wand" userId="de9b44c55c049659" providerId="LiveId" clId="{9FFE94DE-F39B-477D-9C0B-6B69CE1D1F97}" dt="2023-08-31T16:45:22.375" v="915" actId="1076"/>
-      <pc:docMkLst>
-        <pc:docMk/>
-      </pc:docMkLst>
-      <pc:sldChg chg="modNotesTx">
-        <pc:chgData name="Mitchell Wand" userId="de9b44c55c049659" providerId="LiveId" clId="{9FFE94DE-F39B-477D-9C0B-6B69CE1D1F97}" dt="2023-08-31T16:24:50.594" v="47" actId="20577"/>
-        <pc:sldMkLst>
-          <pc:docMk/>
-          <pc:sldMk cId="1614679311" sldId="435"/>
-        </pc:sldMkLst>
-      </pc:sldChg>
-      <pc:sldChg chg="modSp mod">
-        <pc:chgData name="Mitchell Wand" userId="de9b44c55c049659" providerId="LiveId" clId="{9FFE94DE-F39B-477D-9C0B-6B69CE1D1F97}" dt="2023-08-31T16:40:05.770" v="535" actId="20577"/>
-        <pc:sldMkLst>
-          <pc:docMk/>
-          <pc:sldMk cId="4092752779" sldId="451"/>
-        </pc:sldMkLst>
-        <pc:spChg chg="mod">
-          <ac:chgData name="Mitchell Wand" userId="de9b44c55c049659" providerId="LiveId" clId="{9FFE94DE-F39B-477D-9C0B-6B69CE1D1F97}" dt="2023-08-31T16:40:05.770" v="535" actId="20577"/>
-          <ac:spMkLst>
-            <pc:docMk/>
-            <pc:sldMk cId="4092752779" sldId="451"/>
-            <ac:spMk id="3" creationId="{3397E8AC-B462-4A86-A2E6-0AAA24BD3636}"/>
-          </ac:spMkLst>
-        </pc:spChg>
-      </pc:sldChg>
-      <pc:sldChg chg="modNotesTx">
-        <pc:chgData name="Mitchell Wand" userId="de9b44c55c049659" providerId="LiveId" clId="{9FFE94DE-F39B-477D-9C0B-6B69CE1D1F97}" dt="2023-08-31T16:23:37.485" v="5" actId="20577"/>
-        <pc:sldMkLst>
-          <pc:docMk/>
-          <pc:sldMk cId="1471926169" sldId="460"/>
-        </pc:sldMkLst>
-      </pc:sldChg>
-      <pc:sldChg chg="addSp modSp modNotesTx">
-        <pc:chgData name="Mitchell Wand" userId="de9b44c55c049659" providerId="LiveId" clId="{9FFE94DE-F39B-477D-9C0B-6B69CE1D1F97}" dt="2023-08-31T16:37:48.782" v="465"/>
-        <pc:sldMkLst>
-          <pc:docMk/>
-          <pc:sldMk cId="1043216923" sldId="463"/>
-        </pc:sldMkLst>
-        <pc:spChg chg="add mod">
-          <ac:chgData name="Mitchell Wand" userId="de9b44c55c049659" providerId="LiveId" clId="{9FFE94DE-F39B-477D-9C0B-6B69CE1D1F97}" dt="2023-08-31T16:37:48.782" v="465"/>
-          <ac:spMkLst>
-            <pc:docMk/>
-            <pc:sldMk cId="1043216923" sldId="463"/>
-            <ac:spMk id="4" creationId="{3BB475BE-AE37-3692-4A9C-5661488C33AA}"/>
-          </ac:spMkLst>
-        </pc:spChg>
-      </pc:sldChg>
-      <pc:sldChg chg="modNotesTx">
-        <pc:chgData name="Mitchell Wand" userId="de9b44c55c049659" providerId="LiveId" clId="{9FFE94DE-F39B-477D-9C0B-6B69CE1D1F97}" dt="2023-08-31T16:37:13.160" v="461" actId="20577"/>
-        <pc:sldMkLst>
-          <pc:docMk/>
-          <pc:sldMk cId="1462346938" sldId="464"/>
-        </pc:sldMkLst>
-      </pc:sldChg>
-      <pc:sldChg chg="modSp mod">
-        <pc:chgData name="Mitchell Wand" userId="de9b44c55c049659" providerId="LiveId" clId="{9FFE94DE-F39B-477D-9C0B-6B69CE1D1F97}" dt="2023-08-31T16:39:01.332" v="470" actId="1076"/>
-        <pc:sldMkLst>
-          <pc:docMk/>
-          <pc:sldMk cId="56990301" sldId="465"/>
-        </pc:sldMkLst>
-        <pc:spChg chg="mod">
-          <ac:chgData name="Mitchell Wand" userId="de9b44c55c049659" providerId="LiveId" clId="{9FFE94DE-F39B-477D-9C0B-6B69CE1D1F97}" dt="2023-08-31T16:39:01.332" v="470" actId="1076"/>
-          <ac:spMkLst>
-            <pc:docMk/>
-            <pc:sldMk cId="56990301" sldId="465"/>
-            <ac:spMk id="5" creationId="{B85A4EAB-663A-40A2-A994-A0B52463F339}"/>
-          </ac:spMkLst>
-        </pc:spChg>
-      </pc:sldChg>
-      <pc:sldChg chg="modSp mod">
-        <pc:chgData name="Mitchell Wand" userId="de9b44c55c049659" providerId="LiveId" clId="{9FFE94DE-F39B-477D-9C0B-6B69CE1D1F97}" dt="2023-08-31T16:45:22.375" v="915" actId="1076"/>
-        <pc:sldMkLst>
-          <pc:docMk/>
-          <pc:sldMk cId="1988234013" sldId="471"/>
-        </pc:sldMkLst>
-        <pc:spChg chg="mod">
-          <ac:chgData name="Mitchell Wand" userId="de9b44c55c049659" providerId="LiveId" clId="{9FFE94DE-F39B-477D-9C0B-6B69CE1D1F97}" dt="2023-08-31T16:45:22.375" v="915" actId="1076"/>
-          <ac:spMkLst>
-            <pc:docMk/>
-            <pc:sldMk cId="1988234013" sldId="471"/>
-            <ac:spMk id="3" creationId="{2EDAB71C-5E05-8995-2012-0FA009ED264C}"/>
-          </ac:spMkLst>
-        </pc:spChg>
-      </pc:sldChg>
-      <pc:sldChg chg="modSp mod">
-        <pc:chgData name="Mitchell Wand" userId="de9b44c55c049659" providerId="LiveId" clId="{9FFE94DE-F39B-477D-9C0B-6B69CE1D1F97}" dt="2023-08-31T16:22:14.295" v="4" actId="313"/>
-        <pc:sldMkLst>
-          <pc:docMk/>
-          <pc:sldMk cId="3245092809" sldId="496"/>
-        </pc:sldMkLst>
-        <pc:spChg chg="mod">
-          <ac:chgData name="Mitchell Wand" userId="de9b44c55c049659" providerId="LiveId" clId="{9FFE94DE-F39B-477D-9C0B-6B69CE1D1F97}" dt="2023-08-31T16:22:14.295" v="4" actId="313"/>
-          <ac:spMkLst>
-            <pc:docMk/>
-            <pc:sldMk cId="3245092809" sldId="496"/>
-            <ac:spMk id="2" creationId="{8550B63D-BA2A-9CC0-CF4B-BB55A5402492}"/>
-          </ac:spMkLst>
-        </pc:spChg>
-      </pc:sldChg>
-      <pc:sldChg chg="modNotesTx">
-        <pc:chgData name="Mitchell Wand" userId="de9b44c55c049659" providerId="LiveId" clId="{9FFE94DE-F39B-477D-9C0B-6B69CE1D1F97}" dt="2023-08-31T16:25:01.002" v="49" actId="20577"/>
-        <pc:sldMkLst>
-          <pc:docMk/>
-          <pc:sldMk cId="700069445" sldId="501"/>
-        </pc:sldMkLst>
-      </pc:sldChg>
-      <pc:sldChg chg="addSp modSp mod">
-        <pc:chgData name="Mitchell Wand" userId="de9b44c55c049659" providerId="LiveId" clId="{9FFE94DE-F39B-477D-9C0B-6B69CE1D1F97}" dt="2023-08-31T16:37:41.340" v="462"/>
-        <pc:sldMkLst>
-          <pc:docMk/>
-          <pc:sldMk cId="2377701537" sldId="502"/>
-        </pc:sldMkLst>
-        <pc:spChg chg="mod">
-          <ac:chgData name="Mitchell Wand" userId="de9b44c55c049659" providerId="LiveId" clId="{9FFE94DE-F39B-477D-9C0B-6B69CE1D1F97}" dt="2023-08-31T16:27:48.932" v="211" actId="20577"/>
-          <ac:spMkLst>
-            <pc:docMk/>
-            <pc:sldMk cId="2377701537" sldId="502"/>
-            <ac:spMk id="2" creationId="{4CEB8347-843E-21D6-8D6E-557555620D2C}"/>
-          </ac:spMkLst>
-        </pc:spChg>
-        <pc:spChg chg="add mod">
-          <ac:chgData name="Mitchell Wand" userId="de9b44c55c049659" providerId="LiveId" clId="{9FFE94DE-F39B-477D-9C0B-6B69CE1D1F97}" dt="2023-08-31T16:37:41.340" v="462"/>
-          <ac:spMkLst>
-            <pc:docMk/>
-            <pc:sldMk cId="2377701537" sldId="502"/>
-            <ac:spMk id="4" creationId="{BDEECF39-29FF-FB19-2F5F-E836CE244A3E}"/>
-          </ac:spMkLst>
-        </pc:spChg>
-      </pc:sldChg>
-      <pc:sldChg chg="addSp modSp modNotesTx">
-        <pc:chgData name="Mitchell Wand" userId="de9b44c55c049659" providerId="LiveId" clId="{9FFE94DE-F39B-477D-9C0B-6B69CE1D1F97}" dt="2023-08-31T16:37:43.389" v="463"/>
-        <pc:sldMkLst>
-          <pc:docMk/>
-          <pc:sldMk cId="279464109" sldId="504"/>
-        </pc:sldMkLst>
-        <pc:spChg chg="add mod">
-          <ac:chgData name="Mitchell Wand" userId="de9b44c55c049659" providerId="LiveId" clId="{9FFE94DE-F39B-477D-9C0B-6B69CE1D1F97}" dt="2023-08-31T16:37:43.389" v="463"/>
-          <ac:spMkLst>
-            <pc:docMk/>
-            <pc:sldMk cId="279464109" sldId="504"/>
-            <ac:spMk id="5" creationId="{A14661AC-7D23-5070-6773-117C8A21A9D9}"/>
-          </ac:spMkLst>
-        </pc:spChg>
-      </pc:sldChg>
-      <pc:sldChg chg="addSp modSp mod modNotesTx">
-        <pc:chgData name="Mitchell Wand" userId="de9b44c55c049659" providerId="LiveId" clId="{9FFE94DE-F39B-477D-9C0B-6B69CE1D1F97}" dt="2023-08-31T16:37:45.251" v="464"/>
-        <pc:sldMkLst>
-          <pc:docMk/>
-          <pc:sldMk cId="3215464366" sldId="505"/>
-        </pc:sldMkLst>
-        <pc:spChg chg="add mod">
-          <ac:chgData name="Mitchell Wand" userId="de9b44c55c049659" providerId="LiveId" clId="{9FFE94DE-F39B-477D-9C0B-6B69CE1D1F97}" dt="2023-08-31T16:37:45.251" v="464"/>
-          <ac:spMkLst>
-            <pc:docMk/>
-            <pc:sldMk cId="3215464366" sldId="505"/>
-            <ac:spMk id="4" creationId="{9829B9B0-C5FF-2CA6-9E62-021ED034BE59}"/>
-          </ac:spMkLst>
-        </pc:spChg>
-        <pc:spChg chg="mod">
-          <ac:chgData name="Mitchell Wand" userId="de9b44c55c049659" providerId="LiveId" clId="{9FFE94DE-F39B-477D-9C0B-6B69CE1D1F97}" dt="2023-08-31T16:35:28.674" v="372" actId="1076"/>
-          <ac:spMkLst>
-            <pc:docMk/>
-            <pc:sldMk cId="3215464366" sldId="505"/>
-            <ac:spMk id="5" creationId="{8BA3C07E-A53C-6314-ADDE-960ACA8DD153}"/>
-          </ac:spMkLst>
-        </pc:spChg>
-      </pc:sldChg>
-      <pc:sldChg chg="modNotesTx">
-        <pc:chgData name="Mitchell Wand" userId="de9b44c55c049659" providerId="LiveId" clId="{9FFE94DE-F39B-477D-9C0B-6B69CE1D1F97}" dt="2023-08-31T16:41:55.055" v="775" actId="20577"/>
-        <pc:sldMkLst>
-          <pc:docMk/>
-          <pc:sldMk cId="3626688518" sldId="509"/>
-        </pc:sldMkLst>
-      </pc:sldChg>
-      <pc:sldChg chg="modNotesTx">
-        <pc:chgData name="Mitchell Wand" userId="de9b44c55c049659" providerId="LiveId" clId="{9FFE94DE-F39B-477D-9C0B-6B69CE1D1F97}" dt="2023-08-31T16:43:20.289" v="914" actId="20577"/>
-        <pc:sldMkLst>
-          <pc:docMk/>
-          <pc:sldMk cId="833483024" sldId="512"/>
-        </pc:sldMkLst>
-      </pc:sldChg>
-    </pc:docChg>
-  </pc:docChgLst>
-  <pc:docChgLst>
-    <pc:chgData name="Mitchell Wand" userId="de9b44c55c049659" providerId="LiveId" clId="{4A973BDD-CE3E-44C6-9EDF-D54C4EF6B1EE}"/>
-    <pc:docChg chg="modSld">
-      <pc:chgData name="Mitchell Wand" userId="de9b44c55c049659" providerId="LiveId" clId="{4A973BDD-CE3E-44C6-9EDF-D54C4EF6B1EE}" dt="2024-01-12T03:29:52.460" v="1" actId="20577"/>
-      <pc:docMkLst>
-        <pc:docMk/>
-      </pc:docMkLst>
-      <pc:sldChg chg="modNotesTx">
-        <pc:chgData name="Mitchell Wand" userId="de9b44c55c049659" providerId="LiveId" clId="{4A973BDD-CE3E-44C6-9EDF-D54C4EF6B1EE}" dt="2024-01-12T03:29:52.460" v="1" actId="20577"/>
-        <pc:sldMkLst>
-          <pc:docMk/>
-          <pc:sldMk cId="3025610200" sldId="485"/>
-        </pc:sldMkLst>
       </pc:sldChg>
     </pc:docChg>
   </pc:docChgLst>
@@ -1841,6 +1297,718 @@
             <pc:docMk/>
             <pc:sldMk cId="1201284274" sldId="506"/>
             <ac:spMk id="4" creationId="{1A592516-36B2-1CD3-4E40-A6401269824A}"/>
+          </ac:spMkLst>
+        </pc:spChg>
+      </pc:sldChg>
+    </pc:docChg>
+  </pc:docChgLst>
+  <pc:docChgLst>
+    <pc:chgData name="Mitchell Wand" userId="de9b44c55c049659" providerId="LiveId" clId="{EC2E571C-5A66-449C-9EE1-49309F33B3B5}"/>
+    <pc:docChg chg="custSel addSld delSld modSld modSection">
+      <pc:chgData name="Mitchell Wand" userId="de9b44c55c049659" providerId="LiveId" clId="{EC2E571C-5A66-449C-9EE1-49309F33B3B5}" dt="2022-09-20T02:16:55.941" v="686" actId="47"/>
+      <pc:docMkLst>
+        <pc:docMk/>
+      </pc:docMkLst>
+      <pc:sldChg chg="del">
+        <pc:chgData name="Mitchell Wand" userId="de9b44c55c049659" providerId="LiveId" clId="{EC2E571C-5A66-449C-9EE1-49309F33B3B5}" dt="2022-09-20T02:16:55.941" v="686" actId="47"/>
+        <pc:sldMkLst>
+          <pc:docMk/>
+          <pc:sldMk cId="460746757" sldId="378"/>
+        </pc:sldMkLst>
+      </pc:sldChg>
+      <pc:sldChg chg="del">
+        <pc:chgData name="Mitchell Wand" userId="de9b44c55c049659" providerId="LiveId" clId="{EC2E571C-5A66-449C-9EE1-49309F33B3B5}" dt="2022-09-20T02:16:55.941" v="686" actId="47"/>
+        <pc:sldMkLst>
+          <pc:docMk/>
+          <pc:sldMk cId="1550252733" sldId="379"/>
+        </pc:sldMkLst>
+      </pc:sldChg>
+      <pc:sldChg chg="del">
+        <pc:chgData name="Mitchell Wand" userId="de9b44c55c049659" providerId="LiveId" clId="{EC2E571C-5A66-449C-9EE1-49309F33B3B5}" dt="2022-09-20T02:16:55.941" v="686" actId="47"/>
+        <pc:sldMkLst>
+          <pc:docMk/>
+          <pc:sldMk cId="1567996913" sldId="380"/>
+        </pc:sldMkLst>
+      </pc:sldChg>
+      <pc:sldChg chg="del">
+        <pc:chgData name="Mitchell Wand" userId="de9b44c55c049659" providerId="LiveId" clId="{EC2E571C-5A66-449C-9EE1-49309F33B3B5}" dt="2022-09-20T02:16:55.941" v="686" actId="47"/>
+        <pc:sldMkLst>
+          <pc:docMk/>
+          <pc:sldMk cId="3293054105" sldId="406"/>
+        </pc:sldMkLst>
+      </pc:sldChg>
+      <pc:sldChg chg="addSp delSp modSp mod">
+        <pc:chgData name="Mitchell Wand" userId="de9b44c55c049659" providerId="LiveId" clId="{EC2E571C-5A66-449C-9EE1-49309F33B3B5}" dt="2022-09-16T19:29:15.074" v="331" actId="313"/>
+        <pc:sldMkLst>
+          <pc:docMk/>
+          <pc:sldMk cId="1614679311" sldId="435"/>
+        </pc:sldMkLst>
+        <pc:spChg chg="add del mod">
+          <ac:chgData name="Mitchell Wand" userId="de9b44c55c049659" providerId="LiveId" clId="{EC2E571C-5A66-449C-9EE1-49309F33B3B5}" dt="2022-09-16T19:28:26.915" v="218" actId="478"/>
+          <ac:spMkLst>
+            <pc:docMk/>
+            <pc:sldMk cId="1614679311" sldId="435"/>
+            <ac:spMk id="5" creationId="{AC4BE03E-1DFA-D446-D967-7CEDFCBF232F}"/>
+          </ac:spMkLst>
+        </pc:spChg>
+        <pc:spChg chg="add mod">
+          <ac:chgData name="Mitchell Wand" userId="de9b44c55c049659" providerId="LiveId" clId="{EC2E571C-5A66-449C-9EE1-49309F33B3B5}" dt="2022-09-16T19:29:15.074" v="331" actId="313"/>
+          <ac:spMkLst>
+            <pc:docMk/>
+            <pc:sldMk cId="1614679311" sldId="435"/>
+            <ac:spMk id="6" creationId="{19E251ED-E8E3-1106-3E22-8A8B1249E56D}"/>
+          </ac:spMkLst>
+        </pc:spChg>
+      </pc:sldChg>
+      <pc:sldChg chg="addSp delSp modSp mod modNotesTx">
+        <pc:chgData name="Mitchell Wand" userId="de9b44c55c049659" providerId="LiveId" clId="{EC2E571C-5A66-449C-9EE1-49309F33B3B5}" dt="2022-09-16T19:24:06.417" v="192" actId="1076"/>
+        <pc:sldMkLst>
+          <pc:docMk/>
+          <pc:sldMk cId="800228832" sldId="447"/>
+        </pc:sldMkLst>
+        <pc:spChg chg="add del mod">
+          <ac:chgData name="Mitchell Wand" userId="de9b44c55c049659" providerId="LiveId" clId="{EC2E571C-5A66-449C-9EE1-49309F33B3B5}" dt="2022-09-16T19:23:57.499" v="191" actId="478"/>
+          <ac:spMkLst>
+            <pc:docMk/>
+            <pc:sldMk cId="800228832" sldId="447"/>
+            <ac:spMk id="3" creationId="{17C3B57C-7D1C-1CB3-6D46-1BE2F9AA0D80}"/>
+          </ac:spMkLst>
+        </pc:spChg>
+        <pc:spChg chg="add mod">
+          <ac:chgData name="Mitchell Wand" userId="de9b44c55c049659" providerId="LiveId" clId="{EC2E571C-5A66-449C-9EE1-49309F33B3B5}" dt="2022-09-16T19:24:06.417" v="192" actId="1076"/>
+          <ac:spMkLst>
+            <pc:docMk/>
+            <pc:sldMk cId="800228832" sldId="447"/>
+            <ac:spMk id="5" creationId="{2D583A18-EB37-2C64-291E-115AD64B280D}"/>
+          </ac:spMkLst>
+        </pc:spChg>
+        <pc:spChg chg="mod">
+          <ac:chgData name="Mitchell Wand" userId="de9b44c55c049659" providerId="LiveId" clId="{EC2E571C-5A66-449C-9EE1-49309F33B3B5}" dt="2022-09-16T19:18:06.247" v="177" actId="20577"/>
+          <ac:spMkLst>
+            <pc:docMk/>
+            <pc:sldMk cId="800228832" sldId="447"/>
+            <ac:spMk id="11" creationId="{499C7BCB-BC9D-4BD1-B8B1-463CDCFDE915}"/>
+          </ac:spMkLst>
+        </pc:spChg>
+      </pc:sldChg>
+      <pc:sldChg chg="del">
+        <pc:chgData name="Mitchell Wand" userId="de9b44c55c049659" providerId="LiveId" clId="{EC2E571C-5A66-449C-9EE1-49309F33B3B5}" dt="2022-09-16T19:43:28.041" v="619" actId="2696"/>
+        <pc:sldMkLst>
+          <pc:docMk/>
+          <pc:sldMk cId="2911925200" sldId="448"/>
+        </pc:sldMkLst>
+      </pc:sldChg>
+      <pc:sldChg chg="addSp modSp mod">
+        <pc:chgData name="Mitchell Wand" userId="de9b44c55c049659" providerId="LiveId" clId="{EC2E571C-5A66-449C-9EE1-49309F33B3B5}" dt="2022-09-16T19:36:45.191" v="478" actId="20577"/>
+        <pc:sldMkLst>
+          <pc:docMk/>
+          <pc:sldMk cId="1750428041" sldId="457"/>
+        </pc:sldMkLst>
+        <pc:spChg chg="add mod">
+          <ac:chgData name="Mitchell Wand" userId="de9b44c55c049659" providerId="LiveId" clId="{EC2E571C-5A66-449C-9EE1-49309F33B3B5}" dt="2022-09-16T19:36:45.191" v="478" actId="20577"/>
+          <ac:spMkLst>
+            <pc:docMk/>
+            <pc:sldMk cId="1750428041" sldId="457"/>
+            <ac:spMk id="2" creationId="{60B656AB-4242-0551-47E0-F723B829CA79}"/>
+          </ac:spMkLst>
+        </pc:spChg>
+        <pc:spChg chg="mod">
+          <ac:chgData name="Mitchell Wand" userId="de9b44c55c049659" providerId="LiveId" clId="{EC2E571C-5A66-449C-9EE1-49309F33B3B5}" dt="2022-09-16T19:36:22.235" v="461" actId="20577"/>
+          <ac:spMkLst>
+            <pc:docMk/>
+            <pc:sldMk cId="1750428041" sldId="457"/>
+            <ac:spMk id="5" creationId="{7155BEF8-786F-4A11-92EC-982C8864DEC9}"/>
+          </ac:spMkLst>
+        </pc:spChg>
+        <pc:spChg chg="mod">
+          <ac:chgData name="Mitchell Wand" userId="de9b44c55c049659" providerId="LiveId" clId="{EC2E571C-5A66-449C-9EE1-49309F33B3B5}" dt="2022-09-16T19:32:51.898" v="356" actId="14100"/>
+          <ac:spMkLst>
+            <pc:docMk/>
+            <pc:sldMk cId="1750428041" sldId="457"/>
+            <ac:spMk id="8" creationId="{8EA2192A-AD62-4EFB-9689-FF1EAF81C86C}"/>
+          </ac:spMkLst>
+        </pc:spChg>
+      </pc:sldChg>
+      <pc:sldChg chg="addSp delSp modSp mod delAnim">
+        <pc:chgData name="Mitchell Wand" userId="de9b44c55c049659" providerId="LiveId" clId="{EC2E571C-5A66-449C-9EE1-49309F33B3B5}" dt="2022-09-16T19:40:05.537" v="571" actId="20577"/>
+        <pc:sldMkLst>
+          <pc:docMk/>
+          <pc:sldMk cId="152966388" sldId="458"/>
+        </pc:sldMkLst>
+        <pc:spChg chg="add mod">
+          <ac:chgData name="Mitchell Wand" userId="de9b44c55c049659" providerId="LiveId" clId="{EC2E571C-5A66-449C-9EE1-49309F33B3B5}" dt="2022-09-16T19:40:05.537" v="571" actId="20577"/>
+          <ac:spMkLst>
+            <pc:docMk/>
+            <pc:sldMk cId="152966388" sldId="458"/>
+            <ac:spMk id="3" creationId="{5AC96520-B8C4-796E-18FA-D95CA5394859}"/>
+          </ac:spMkLst>
+        </pc:spChg>
+        <pc:spChg chg="add mod">
+          <ac:chgData name="Mitchell Wand" userId="de9b44c55c049659" providerId="LiveId" clId="{EC2E571C-5A66-449C-9EE1-49309F33B3B5}" dt="2022-09-16T19:39:43.203" v="566" actId="1076"/>
+          <ac:spMkLst>
+            <pc:docMk/>
+            <pc:sldMk cId="152966388" sldId="458"/>
+            <ac:spMk id="5" creationId="{831547E0-8745-0296-3E34-5C36244F2E82}"/>
+          </ac:spMkLst>
+        </pc:spChg>
+        <pc:spChg chg="mod">
+          <ac:chgData name="Mitchell Wand" userId="de9b44c55c049659" providerId="LiveId" clId="{EC2E571C-5A66-449C-9EE1-49309F33B3B5}" dt="2022-09-16T19:33:18.959" v="363" actId="20577"/>
+          <ac:spMkLst>
+            <pc:docMk/>
+            <pc:sldMk cId="152966388" sldId="458"/>
+            <ac:spMk id="6" creationId="{14EA479B-1118-49C6-B718-DB9189AC9DA4}"/>
+          </ac:spMkLst>
+        </pc:spChg>
+        <pc:spChg chg="del mod">
+          <ac:chgData name="Mitchell Wand" userId="de9b44c55c049659" providerId="LiveId" clId="{EC2E571C-5A66-449C-9EE1-49309F33B3B5}" dt="2022-09-16T19:38:26.308" v="503" actId="478"/>
+          <ac:spMkLst>
+            <pc:docMk/>
+            <pc:sldMk cId="152966388" sldId="458"/>
+            <ac:spMk id="7" creationId="{08DBB5C8-71A8-4040-840C-6B42DA072E84}"/>
+          </ac:spMkLst>
+        </pc:spChg>
+        <pc:spChg chg="del">
+          <ac:chgData name="Mitchell Wand" userId="de9b44c55c049659" providerId="LiveId" clId="{EC2E571C-5A66-449C-9EE1-49309F33B3B5}" dt="2022-09-16T19:38:27.828" v="504" actId="478"/>
+          <ac:spMkLst>
+            <pc:docMk/>
+            <pc:sldMk cId="152966388" sldId="458"/>
+            <ac:spMk id="8" creationId="{9C9F3FE7-3D06-467F-9E42-2B570A18A275}"/>
+          </ac:spMkLst>
+        </pc:spChg>
+        <pc:spChg chg="add mod">
+          <ac:chgData name="Mitchell Wand" userId="de9b44c55c049659" providerId="LiveId" clId="{EC2E571C-5A66-449C-9EE1-49309F33B3B5}" dt="2022-09-16T19:39:48.838" v="567" actId="1076"/>
+          <ac:spMkLst>
+            <pc:docMk/>
+            <pc:sldMk cId="152966388" sldId="458"/>
+            <ac:spMk id="9" creationId="{81B12048-2355-7B79-BF56-1A6431BF14F8}"/>
+          </ac:spMkLst>
+        </pc:spChg>
+      </pc:sldChg>
+      <pc:sldChg chg="del">
+        <pc:chgData name="Mitchell Wand" userId="de9b44c55c049659" providerId="LiveId" clId="{EC2E571C-5A66-449C-9EE1-49309F33B3B5}" dt="2022-09-16T19:40:29.782" v="572" actId="2696"/>
+        <pc:sldMkLst>
+          <pc:docMk/>
+          <pc:sldMk cId="3014336577" sldId="459"/>
+        </pc:sldMkLst>
+      </pc:sldChg>
+      <pc:sldChg chg="addSp delSp modSp mod delAnim">
+        <pc:chgData name="Mitchell Wand" userId="de9b44c55c049659" providerId="LiveId" clId="{EC2E571C-5A66-449C-9EE1-49309F33B3B5}" dt="2022-09-16T19:42:33.781" v="617" actId="20577"/>
+        <pc:sldMkLst>
+          <pc:docMk/>
+          <pc:sldMk cId="1471926169" sldId="460"/>
+        </pc:sldMkLst>
+        <pc:spChg chg="mod">
+          <ac:chgData name="Mitchell Wand" userId="de9b44c55c049659" providerId="LiveId" clId="{EC2E571C-5A66-449C-9EE1-49309F33B3B5}" dt="2022-09-16T19:42:33.781" v="617" actId="20577"/>
+          <ac:spMkLst>
+            <pc:docMk/>
+            <pc:sldMk cId="1471926169" sldId="460"/>
+            <ac:spMk id="2" creationId="{FE36DEDC-D4E3-4C9B-933B-A38B72F2F79D}"/>
+          </ac:spMkLst>
+        </pc:spChg>
+        <pc:spChg chg="add mod">
+          <ac:chgData name="Mitchell Wand" userId="de9b44c55c049659" providerId="LiveId" clId="{EC2E571C-5A66-449C-9EE1-49309F33B3B5}" dt="2022-09-16T19:41:42.179" v="583" actId="1076"/>
+          <ac:spMkLst>
+            <pc:docMk/>
+            <pc:sldMk cId="1471926169" sldId="460"/>
+            <ac:spMk id="3" creationId="{F4A56094-3F41-A93D-8604-EB2C5109B119}"/>
+          </ac:spMkLst>
+        </pc:spChg>
+        <pc:spChg chg="mod">
+          <ac:chgData name="Mitchell Wand" userId="de9b44c55c049659" providerId="LiveId" clId="{EC2E571C-5A66-449C-9EE1-49309F33B3B5}" dt="2022-09-16T19:42:13.037" v="585" actId="1076"/>
+          <ac:spMkLst>
+            <pc:docMk/>
+            <pc:sldMk cId="1471926169" sldId="460"/>
+            <ac:spMk id="6" creationId="{914F242F-B894-4E59-A219-59B9174F3CB3}"/>
+          </ac:spMkLst>
+        </pc:spChg>
+        <pc:spChg chg="del">
+          <ac:chgData name="Mitchell Wand" userId="de9b44c55c049659" providerId="LiveId" clId="{EC2E571C-5A66-449C-9EE1-49309F33B3B5}" dt="2022-09-16T19:41:32.012" v="581" actId="478"/>
+          <ac:spMkLst>
+            <pc:docMk/>
+            <pc:sldMk cId="1471926169" sldId="460"/>
+            <ac:spMk id="7" creationId="{6175C8DB-FF27-493F-9D79-8F4CDEADD4CC}"/>
+          </ac:spMkLst>
+        </pc:spChg>
+      </pc:sldChg>
+      <pc:sldChg chg="del">
+        <pc:chgData name="Mitchell Wand" userId="de9b44c55c049659" providerId="LiveId" clId="{EC2E571C-5A66-449C-9EE1-49309F33B3B5}" dt="2022-09-16T18:59:45.093" v="1" actId="2696"/>
+        <pc:sldMkLst>
+          <pc:docMk/>
+          <pc:sldMk cId="3988182231" sldId="487"/>
+        </pc:sldMkLst>
+      </pc:sldChg>
+      <pc:sldChg chg="addSp modSp mod">
+        <pc:chgData name="Mitchell Wand" userId="de9b44c55c049659" providerId="LiveId" clId="{EC2E571C-5A66-449C-9EE1-49309F33B3B5}" dt="2022-09-16T19:24:56.350" v="212" actId="20577"/>
+        <pc:sldMkLst>
+          <pc:docMk/>
+          <pc:sldMk cId="84402381" sldId="488"/>
+        </pc:sldMkLst>
+        <pc:spChg chg="add mod">
+          <ac:chgData name="Mitchell Wand" userId="de9b44c55c049659" providerId="LiveId" clId="{EC2E571C-5A66-449C-9EE1-49309F33B3B5}" dt="2022-09-16T19:24:18.873" v="197" actId="20577"/>
+          <ac:spMkLst>
+            <pc:docMk/>
+            <pc:sldMk cId="84402381" sldId="488"/>
+            <ac:spMk id="3" creationId="{6807ABB3-400B-5377-8373-242196443552}"/>
+          </ac:spMkLst>
+        </pc:spChg>
+        <pc:spChg chg="mod">
+          <ac:chgData name="Mitchell Wand" userId="de9b44c55c049659" providerId="LiveId" clId="{EC2E571C-5A66-449C-9EE1-49309F33B3B5}" dt="2022-09-16T19:24:56.350" v="212" actId="20577"/>
+          <ac:spMkLst>
+            <pc:docMk/>
+            <pc:sldMk cId="84402381" sldId="488"/>
+            <ac:spMk id="11" creationId="{499C7BCB-BC9D-4BD1-B8B1-463CDCFDE915}"/>
+          </ac:spMkLst>
+        </pc:spChg>
+      </pc:sldChg>
+      <pc:sldChg chg="modSp mod">
+        <pc:chgData name="Mitchell Wand" userId="de9b44c55c049659" providerId="LiveId" clId="{EC2E571C-5A66-449C-9EE1-49309F33B3B5}" dt="2022-09-16T19:01:28.744" v="150" actId="20577"/>
+        <pc:sldMkLst>
+          <pc:docMk/>
+          <pc:sldMk cId="2976171112" sldId="500"/>
+        </pc:sldMkLst>
+        <pc:spChg chg="mod">
+          <ac:chgData name="Mitchell Wand" userId="de9b44c55c049659" providerId="LiveId" clId="{EC2E571C-5A66-449C-9EE1-49309F33B3B5}" dt="2022-09-16T19:01:28.744" v="150" actId="20577"/>
+          <ac:spMkLst>
+            <pc:docMk/>
+            <pc:sldMk cId="2976171112" sldId="500"/>
+            <ac:spMk id="3" creationId="{5D7C592F-1F68-3262-275C-DAAE284725A7}"/>
+          </ac:spMkLst>
+        </pc:spChg>
+      </pc:sldChg>
+      <pc:sldChg chg="addSp delSp modSp mod">
+        <pc:chgData name="Mitchell Wand" userId="de9b44c55c049659" providerId="LiveId" clId="{EC2E571C-5A66-449C-9EE1-49309F33B3B5}" dt="2022-09-16T20:04:37.081" v="677" actId="1076"/>
+        <pc:sldMkLst>
+          <pc:docMk/>
+          <pc:sldMk cId="700069445" sldId="501"/>
+        </pc:sldMkLst>
+        <pc:spChg chg="add mod">
+          <ac:chgData name="Mitchell Wand" userId="de9b44c55c049659" providerId="LiveId" clId="{EC2E571C-5A66-449C-9EE1-49309F33B3B5}" dt="2022-09-16T20:04:37.081" v="677" actId="1076"/>
+          <ac:spMkLst>
+            <pc:docMk/>
+            <pc:sldMk cId="700069445" sldId="501"/>
+            <ac:spMk id="4" creationId="{DF6A7977-8F3E-578F-0410-B9988554EBC0}"/>
+          </ac:spMkLst>
+        </pc:spChg>
+        <pc:spChg chg="del">
+          <ac:chgData name="Mitchell Wand" userId="de9b44c55c049659" providerId="LiveId" clId="{EC2E571C-5A66-449C-9EE1-49309F33B3B5}" dt="2022-09-16T20:04:23.609" v="675" actId="478"/>
+          <ac:spMkLst>
+            <pc:docMk/>
+            <pc:sldMk cId="700069445" sldId="501"/>
+            <ac:spMk id="6" creationId="{C4A86ECB-3B1A-487B-9D78-68C1FB3C8902}"/>
+          </ac:spMkLst>
+        </pc:spChg>
+        <pc:spChg chg="mod">
+          <ac:chgData name="Mitchell Wand" userId="de9b44c55c049659" providerId="LiveId" clId="{EC2E571C-5A66-449C-9EE1-49309F33B3B5}" dt="2022-09-16T20:03:27.865" v="630" actId="20577"/>
+          <ac:spMkLst>
+            <pc:docMk/>
+            <pc:sldMk cId="700069445" sldId="501"/>
+            <ac:spMk id="8" creationId="{0FFEFE51-74B1-2646-A6E9-1832E8A6E76A}"/>
+          </ac:spMkLst>
+        </pc:spChg>
+      </pc:sldChg>
+      <pc:sldChg chg="modSp mod">
+        <pc:chgData name="Mitchell Wand" userId="de9b44c55c049659" providerId="LiveId" clId="{EC2E571C-5A66-449C-9EE1-49309F33B3B5}" dt="2022-09-16T20:06:22.052" v="685"/>
+        <pc:sldMkLst>
+          <pc:docMk/>
+          <pc:sldMk cId="2377701537" sldId="502"/>
+        </pc:sldMkLst>
+        <pc:spChg chg="mod">
+          <ac:chgData name="Mitchell Wand" userId="de9b44c55c049659" providerId="LiveId" clId="{EC2E571C-5A66-449C-9EE1-49309F33B3B5}" dt="2022-09-16T20:04:53.348" v="683" actId="20577"/>
+          <ac:spMkLst>
+            <pc:docMk/>
+            <pc:sldMk cId="2377701537" sldId="502"/>
+            <ac:spMk id="2" creationId="{4CEB8347-843E-21D6-8D6E-557555620D2C}"/>
+          </ac:spMkLst>
+        </pc:spChg>
+        <pc:spChg chg="mod">
+          <ac:chgData name="Mitchell Wand" userId="de9b44c55c049659" providerId="LiveId" clId="{EC2E571C-5A66-449C-9EE1-49309F33B3B5}" dt="2022-09-16T20:06:22.052" v="685"/>
+          <ac:spMkLst>
+            <pc:docMk/>
+            <pc:sldMk cId="2377701537" sldId="502"/>
+            <ac:spMk id="5" creationId="{67FCC827-28CD-0EDD-710E-CA98CE22E5CB}"/>
+          </ac:spMkLst>
+        </pc:spChg>
+      </pc:sldChg>
+      <pc:sldChg chg="del">
+        <pc:chgData name="Mitchell Wand" userId="de9b44c55c049659" providerId="LiveId" clId="{EC2E571C-5A66-449C-9EE1-49309F33B3B5}" dt="2022-09-20T02:16:55.941" v="686" actId="47"/>
+        <pc:sldMkLst>
+          <pc:docMk/>
+          <pc:sldMk cId="3753540932" sldId="503"/>
+        </pc:sldMkLst>
+      </pc:sldChg>
+      <pc:sldChg chg="add">
+        <pc:chgData name="Mitchell Wand" userId="de9b44c55c049659" providerId="LiveId" clId="{EC2E571C-5A66-449C-9EE1-49309F33B3B5}" dt="2022-09-16T18:59:40.797" v="0"/>
+        <pc:sldMkLst>
+          <pc:docMk/>
+          <pc:sldMk cId="1544083876" sldId="508"/>
+        </pc:sldMkLst>
+      </pc:sldChg>
+      <pc:sldChg chg="add">
+        <pc:chgData name="Mitchell Wand" userId="de9b44c55c049659" providerId="LiveId" clId="{EC2E571C-5A66-449C-9EE1-49309F33B3B5}" dt="2022-09-16T19:43:00.821" v="618"/>
+        <pc:sldMkLst>
+          <pc:docMk/>
+          <pc:sldMk cId="1210151535" sldId="509"/>
+        </pc:sldMkLst>
+      </pc:sldChg>
+      <pc:sldChg chg="modSp add del mod">
+        <pc:chgData name="Mitchell Wand" userId="de9b44c55c049659" providerId="LiveId" clId="{EC2E571C-5A66-449C-9EE1-49309F33B3B5}" dt="2022-09-16T19:01:35.550" v="151" actId="2696"/>
+        <pc:sldMkLst>
+          <pc:docMk/>
+          <pc:sldMk cId="2144624189" sldId="509"/>
+        </pc:sldMkLst>
+        <pc:spChg chg="mod">
+          <ac:chgData name="Mitchell Wand" userId="de9b44c55c049659" providerId="LiveId" clId="{EC2E571C-5A66-449C-9EE1-49309F33B3B5}" dt="2022-09-16T19:01:03.021" v="126" actId="21"/>
+          <ac:spMkLst>
+            <pc:docMk/>
+            <pc:sldMk cId="2144624189" sldId="509"/>
+            <ac:spMk id="3" creationId="{5D7C592F-1F68-3262-275C-DAAE284725A7}"/>
+          </ac:spMkLst>
+        </pc:spChg>
+      </pc:sldChg>
+    </pc:docChg>
+  </pc:docChgLst>
+  <pc:docChgLst>
+    <pc:chgData name="Mitchell Wand" userId="de9b44c55c049659" providerId="LiveId" clId="{9FFE94DE-F39B-477D-9C0B-6B69CE1D1F97}"/>
+    <pc:docChg chg="custSel modSld">
+      <pc:chgData name="Mitchell Wand" userId="de9b44c55c049659" providerId="LiveId" clId="{9FFE94DE-F39B-477D-9C0B-6B69CE1D1F97}" dt="2023-08-31T16:45:22.375" v="915" actId="1076"/>
+      <pc:docMkLst>
+        <pc:docMk/>
+      </pc:docMkLst>
+      <pc:sldChg chg="modNotesTx">
+        <pc:chgData name="Mitchell Wand" userId="de9b44c55c049659" providerId="LiveId" clId="{9FFE94DE-F39B-477D-9C0B-6B69CE1D1F97}" dt="2023-08-31T16:24:50.594" v="47" actId="20577"/>
+        <pc:sldMkLst>
+          <pc:docMk/>
+          <pc:sldMk cId="1614679311" sldId="435"/>
+        </pc:sldMkLst>
+      </pc:sldChg>
+      <pc:sldChg chg="modSp mod">
+        <pc:chgData name="Mitchell Wand" userId="de9b44c55c049659" providerId="LiveId" clId="{9FFE94DE-F39B-477D-9C0B-6B69CE1D1F97}" dt="2023-08-31T16:40:05.770" v="535" actId="20577"/>
+        <pc:sldMkLst>
+          <pc:docMk/>
+          <pc:sldMk cId="4092752779" sldId="451"/>
+        </pc:sldMkLst>
+        <pc:spChg chg="mod">
+          <ac:chgData name="Mitchell Wand" userId="de9b44c55c049659" providerId="LiveId" clId="{9FFE94DE-F39B-477D-9C0B-6B69CE1D1F97}" dt="2023-08-31T16:40:05.770" v="535" actId="20577"/>
+          <ac:spMkLst>
+            <pc:docMk/>
+            <pc:sldMk cId="4092752779" sldId="451"/>
+            <ac:spMk id="3" creationId="{3397E8AC-B462-4A86-A2E6-0AAA24BD3636}"/>
+          </ac:spMkLst>
+        </pc:spChg>
+      </pc:sldChg>
+      <pc:sldChg chg="modNotesTx">
+        <pc:chgData name="Mitchell Wand" userId="de9b44c55c049659" providerId="LiveId" clId="{9FFE94DE-F39B-477D-9C0B-6B69CE1D1F97}" dt="2023-08-31T16:23:37.485" v="5" actId="20577"/>
+        <pc:sldMkLst>
+          <pc:docMk/>
+          <pc:sldMk cId="1471926169" sldId="460"/>
+        </pc:sldMkLst>
+      </pc:sldChg>
+      <pc:sldChg chg="addSp modSp modNotesTx">
+        <pc:chgData name="Mitchell Wand" userId="de9b44c55c049659" providerId="LiveId" clId="{9FFE94DE-F39B-477D-9C0B-6B69CE1D1F97}" dt="2023-08-31T16:37:48.782" v="465"/>
+        <pc:sldMkLst>
+          <pc:docMk/>
+          <pc:sldMk cId="1043216923" sldId="463"/>
+        </pc:sldMkLst>
+        <pc:spChg chg="add mod">
+          <ac:chgData name="Mitchell Wand" userId="de9b44c55c049659" providerId="LiveId" clId="{9FFE94DE-F39B-477D-9C0B-6B69CE1D1F97}" dt="2023-08-31T16:37:48.782" v="465"/>
+          <ac:spMkLst>
+            <pc:docMk/>
+            <pc:sldMk cId="1043216923" sldId="463"/>
+            <ac:spMk id="4" creationId="{3BB475BE-AE37-3692-4A9C-5661488C33AA}"/>
+          </ac:spMkLst>
+        </pc:spChg>
+      </pc:sldChg>
+      <pc:sldChg chg="modNotesTx">
+        <pc:chgData name="Mitchell Wand" userId="de9b44c55c049659" providerId="LiveId" clId="{9FFE94DE-F39B-477D-9C0B-6B69CE1D1F97}" dt="2023-08-31T16:37:13.160" v="461" actId="20577"/>
+        <pc:sldMkLst>
+          <pc:docMk/>
+          <pc:sldMk cId="1462346938" sldId="464"/>
+        </pc:sldMkLst>
+      </pc:sldChg>
+      <pc:sldChg chg="modSp mod">
+        <pc:chgData name="Mitchell Wand" userId="de9b44c55c049659" providerId="LiveId" clId="{9FFE94DE-F39B-477D-9C0B-6B69CE1D1F97}" dt="2023-08-31T16:39:01.332" v="470" actId="1076"/>
+        <pc:sldMkLst>
+          <pc:docMk/>
+          <pc:sldMk cId="56990301" sldId="465"/>
+        </pc:sldMkLst>
+        <pc:spChg chg="mod">
+          <ac:chgData name="Mitchell Wand" userId="de9b44c55c049659" providerId="LiveId" clId="{9FFE94DE-F39B-477D-9C0B-6B69CE1D1F97}" dt="2023-08-31T16:39:01.332" v="470" actId="1076"/>
+          <ac:spMkLst>
+            <pc:docMk/>
+            <pc:sldMk cId="56990301" sldId="465"/>
+            <ac:spMk id="5" creationId="{B85A4EAB-663A-40A2-A994-A0B52463F339}"/>
+          </ac:spMkLst>
+        </pc:spChg>
+      </pc:sldChg>
+      <pc:sldChg chg="modSp mod">
+        <pc:chgData name="Mitchell Wand" userId="de9b44c55c049659" providerId="LiveId" clId="{9FFE94DE-F39B-477D-9C0B-6B69CE1D1F97}" dt="2023-08-31T16:45:22.375" v="915" actId="1076"/>
+        <pc:sldMkLst>
+          <pc:docMk/>
+          <pc:sldMk cId="1988234013" sldId="471"/>
+        </pc:sldMkLst>
+        <pc:spChg chg="mod">
+          <ac:chgData name="Mitchell Wand" userId="de9b44c55c049659" providerId="LiveId" clId="{9FFE94DE-F39B-477D-9C0B-6B69CE1D1F97}" dt="2023-08-31T16:45:22.375" v="915" actId="1076"/>
+          <ac:spMkLst>
+            <pc:docMk/>
+            <pc:sldMk cId="1988234013" sldId="471"/>
+            <ac:spMk id="3" creationId="{2EDAB71C-5E05-8995-2012-0FA009ED264C}"/>
+          </ac:spMkLst>
+        </pc:spChg>
+      </pc:sldChg>
+      <pc:sldChg chg="modSp mod">
+        <pc:chgData name="Mitchell Wand" userId="de9b44c55c049659" providerId="LiveId" clId="{9FFE94DE-F39B-477D-9C0B-6B69CE1D1F97}" dt="2023-08-31T16:22:14.295" v="4" actId="313"/>
+        <pc:sldMkLst>
+          <pc:docMk/>
+          <pc:sldMk cId="3245092809" sldId="496"/>
+        </pc:sldMkLst>
+        <pc:spChg chg="mod">
+          <ac:chgData name="Mitchell Wand" userId="de9b44c55c049659" providerId="LiveId" clId="{9FFE94DE-F39B-477D-9C0B-6B69CE1D1F97}" dt="2023-08-31T16:22:14.295" v="4" actId="313"/>
+          <ac:spMkLst>
+            <pc:docMk/>
+            <pc:sldMk cId="3245092809" sldId="496"/>
+            <ac:spMk id="2" creationId="{8550B63D-BA2A-9CC0-CF4B-BB55A5402492}"/>
+          </ac:spMkLst>
+        </pc:spChg>
+      </pc:sldChg>
+      <pc:sldChg chg="modNotesTx">
+        <pc:chgData name="Mitchell Wand" userId="de9b44c55c049659" providerId="LiveId" clId="{9FFE94DE-F39B-477D-9C0B-6B69CE1D1F97}" dt="2023-08-31T16:25:01.002" v="49" actId="20577"/>
+        <pc:sldMkLst>
+          <pc:docMk/>
+          <pc:sldMk cId="700069445" sldId="501"/>
+        </pc:sldMkLst>
+      </pc:sldChg>
+      <pc:sldChg chg="addSp modSp mod">
+        <pc:chgData name="Mitchell Wand" userId="de9b44c55c049659" providerId="LiveId" clId="{9FFE94DE-F39B-477D-9C0B-6B69CE1D1F97}" dt="2023-08-31T16:37:41.340" v="462"/>
+        <pc:sldMkLst>
+          <pc:docMk/>
+          <pc:sldMk cId="2377701537" sldId="502"/>
+        </pc:sldMkLst>
+        <pc:spChg chg="mod">
+          <ac:chgData name="Mitchell Wand" userId="de9b44c55c049659" providerId="LiveId" clId="{9FFE94DE-F39B-477D-9C0B-6B69CE1D1F97}" dt="2023-08-31T16:27:48.932" v="211" actId="20577"/>
+          <ac:spMkLst>
+            <pc:docMk/>
+            <pc:sldMk cId="2377701537" sldId="502"/>
+            <ac:spMk id="2" creationId="{4CEB8347-843E-21D6-8D6E-557555620D2C}"/>
+          </ac:spMkLst>
+        </pc:spChg>
+        <pc:spChg chg="add mod">
+          <ac:chgData name="Mitchell Wand" userId="de9b44c55c049659" providerId="LiveId" clId="{9FFE94DE-F39B-477D-9C0B-6B69CE1D1F97}" dt="2023-08-31T16:37:41.340" v="462"/>
+          <ac:spMkLst>
+            <pc:docMk/>
+            <pc:sldMk cId="2377701537" sldId="502"/>
+            <ac:spMk id="4" creationId="{BDEECF39-29FF-FB19-2F5F-E836CE244A3E}"/>
+          </ac:spMkLst>
+        </pc:spChg>
+      </pc:sldChg>
+      <pc:sldChg chg="addSp modSp modNotesTx">
+        <pc:chgData name="Mitchell Wand" userId="de9b44c55c049659" providerId="LiveId" clId="{9FFE94DE-F39B-477D-9C0B-6B69CE1D1F97}" dt="2023-08-31T16:37:43.389" v="463"/>
+        <pc:sldMkLst>
+          <pc:docMk/>
+          <pc:sldMk cId="279464109" sldId="504"/>
+        </pc:sldMkLst>
+        <pc:spChg chg="add mod">
+          <ac:chgData name="Mitchell Wand" userId="de9b44c55c049659" providerId="LiveId" clId="{9FFE94DE-F39B-477D-9C0B-6B69CE1D1F97}" dt="2023-08-31T16:37:43.389" v="463"/>
+          <ac:spMkLst>
+            <pc:docMk/>
+            <pc:sldMk cId="279464109" sldId="504"/>
+            <ac:spMk id="5" creationId="{A14661AC-7D23-5070-6773-117C8A21A9D9}"/>
+          </ac:spMkLst>
+        </pc:spChg>
+      </pc:sldChg>
+      <pc:sldChg chg="addSp modSp mod modNotesTx">
+        <pc:chgData name="Mitchell Wand" userId="de9b44c55c049659" providerId="LiveId" clId="{9FFE94DE-F39B-477D-9C0B-6B69CE1D1F97}" dt="2023-08-31T16:37:45.251" v="464"/>
+        <pc:sldMkLst>
+          <pc:docMk/>
+          <pc:sldMk cId="3215464366" sldId="505"/>
+        </pc:sldMkLst>
+        <pc:spChg chg="add mod">
+          <ac:chgData name="Mitchell Wand" userId="de9b44c55c049659" providerId="LiveId" clId="{9FFE94DE-F39B-477D-9C0B-6B69CE1D1F97}" dt="2023-08-31T16:37:45.251" v="464"/>
+          <ac:spMkLst>
+            <pc:docMk/>
+            <pc:sldMk cId="3215464366" sldId="505"/>
+            <ac:spMk id="4" creationId="{9829B9B0-C5FF-2CA6-9E62-021ED034BE59}"/>
+          </ac:spMkLst>
+        </pc:spChg>
+        <pc:spChg chg="mod">
+          <ac:chgData name="Mitchell Wand" userId="de9b44c55c049659" providerId="LiveId" clId="{9FFE94DE-F39B-477D-9C0B-6B69CE1D1F97}" dt="2023-08-31T16:35:28.674" v="372" actId="1076"/>
+          <ac:spMkLst>
+            <pc:docMk/>
+            <pc:sldMk cId="3215464366" sldId="505"/>
+            <ac:spMk id="5" creationId="{8BA3C07E-A53C-6314-ADDE-960ACA8DD153}"/>
+          </ac:spMkLst>
+        </pc:spChg>
+      </pc:sldChg>
+      <pc:sldChg chg="modNotesTx">
+        <pc:chgData name="Mitchell Wand" userId="de9b44c55c049659" providerId="LiveId" clId="{9FFE94DE-F39B-477D-9C0B-6B69CE1D1F97}" dt="2023-08-31T16:41:55.055" v="775" actId="20577"/>
+        <pc:sldMkLst>
+          <pc:docMk/>
+          <pc:sldMk cId="3626688518" sldId="509"/>
+        </pc:sldMkLst>
+      </pc:sldChg>
+      <pc:sldChg chg="modNotesTx">
+        <pc:chgData name="Mitchell Wand" userId="de9b44c55c049659" providerId="LiveId" clId="{9FFE94DE-F39B-477D-9C0B-6B69CE1D1F97}" dt="2023-08-31T16:43:20.289" v="914" actId="20577"/>
+        <pc:sldMkLst>
+          <pc:docMk/>
+          <pc:sldMk cId="833483024" sldId="512"/>
+        </pc:sldMkLst>
+      </pc:sldChg>
+    </pc:docChg>
+  </pc:docChgLst>
+  <pc:docChgLst>
+    <pc:chgData name="Mitchell Wand" userId="de9b44c55c049659" providerId="LiveId" clId="{8C92D9B1-57F9-4FA7-AF99-4475187A1412}"/>
+    <pc:docChg chg="undo custSel modSld">
+      <pc:chgData name="Mitchell Wand" userId="de9b44c55c049659" providerId="LiveId" clId="{8C92D9B1-57F9-4FA7-AF99-4475187A1412}" dt="2024-01-21T17:18:38.444" v="516" actId="20577"/>
+      <pc:docMkLst>
+        <pc:docMk/>
+      </pc:docMkLst>
+      <pc:sldChg chg="modSp mod">
+        <pc:chgData name="Mitchell Wand" userId="de9b44c55c049659" providerId="LiveId" clId="{8C92D9B1-57F9-4FA7-AF99-4475187A1412}" dt="2024-01-21T17:09:54.698" v="391" actId="20577"/>
+        <pc:sldMkLst>
+          <pc:docMk/>
+          <pc:sldMk cId="4189392190" sldId="433"/>
+        </pc:sldMkLst>
+        <pc:spChg chg="mod">
+          <ac:chgData name="Mitchell Wand" userId="de9b44c55c049659" providerId="LiveId" clId="{8C92D9B1-57F9-4FA7-AF99-4475187A1412}" dt="2024-01-21T17:09:54.698" v="391" actId="20577"/>
+          <ac:spMkLst>
+            <pc:docMk/>
+            <pc:sldMk cId="4189392190" sldId="433"/>
+            <ac:spMk id="3" creationId="{B961C685-5760-44FE-A6EF-DD57E096CA0C}"/>
+          </ac:spMkLst>
+        </pc:spChg>
+      </pc:sldChg>
+      <pc:sldChg chg="modSp mod modNotesTx">
+        <pc:chgData name="Mitchell Wand" userId="de9b44c55c049659" providerId="LiveId" clId="{8C92D9B1-57F9-4FA7-AF99-4475187A1412}" dt="2024-01-21T17:10:12.332" v="393" actId="20577"/>
+        <pc:sldMkLst>
+          <pc:docMk/>
+          <pc:sldMk cId="800228832" sldId="447"/>
+        </pc:sldMkLst>
+        <pc:spChg chg="mod">
+          <ac:chgData name="Mitchell Wand" userId="de9b44c55c049659" providerId="LiveId" clId="{8C92D9B1-57F9-4FA7-AF99-4475187A1412}" dt="2024-01-21T17:10:12.332" v="393" actId="20577"/>
+          <ac:spMkLst>
+            <pc:docMk/>
+            <pc:sldMk cId="800228832" sldId="447"/>
+            <ac:spMk id="2" creationId="{9BA5B06C-6C50-4733-A873-0B9C4F6503DA}"/>
+          </ac:spMkLst>
+        </pc:spChg>
+      </pc:sldChg>
+      <pc:sldChg chg="modSp mod modNotesTx">
+        <pc:chgData name="Mitchell Wand" userId="de9b44c55c049659" providerId="LiveId" clId="{8C92D9B1-57F9-4FA7-AF99-4475187A1412}" dt="2024-01-21T17:18:38.444" v="516" actId="20577"/>
+        <pc:sldMkLst>
+          <pc:docMk/>
+          <pc:sldMk cId="568162185" sldId="456"/>
+        </pc:sldMkLst>
+        <pc:spChg chg="mod">
+          <ac:chgData name="Mitchell Wand" userId="de9b44c55c049659" providerId="LiveId" clId="{8C92D9B1-57F9-4FA7-AF99-4475187A1412}" dt="2024-01-21T17:11:00.235" v="399" actId="20577"/>
+          <ac:spMkLst>
+            <pc:docMk/>
+            <pc:sldMk cId="568162185" sldId="456"/>
+            <ac:spMk id="2" creationId="{912E63C2-291F-4BCD-8481-B88CD1E437D8}"/>
+          </ac:spMkLst>
+        </pc:spChg>
+      </pc:sldChg>
+      <pc:sldChg chg="modSp mod">
+        <pc:chgData name="Mitchell Wand" userId="de9b44c55c049659" providerId="LiveId" clId="{8C92D9B1-57F9-4FA7-AF99-4475187A1412}" dt="2024-01-21T17:08:05.670" v="317" actId="20577"/>
+        <pc:sldMkLst>
+          <pc:docMk/>
+          <pc:sldMk cId="1750428041" sldId="457"/>
+        </pc:sldMkLst>
+        <pc:spChg chg="mod">
+          <ac:chgData name="Mitchell Wand" userId="de9b44c55c049659" providerId="LiveId" clId="{8C92D9B1-57F9-4FA7-AF99-4475187A1412}" dt="2024-01-21T17:08:05.670" v="317" actId="20577"/>
+          <ac:spMkLst>
+            <pc:docMk/>
+            <pc:sldMk cId="1750428041" sldId="457"/>
+            <ac:spMk id="5" creationId="{7155BEF8-786F-4A11-92EC-982C8864DEC9}"/>
+          </ac:spMkLst>
+        </pc:spChg>
+      </pc:sldChg>
+      <pc:sldChg chg="modSp mod">
+        <pc:chgData name="Mitchell Wand" userId="de9b44c55c049659" providerId="LiveId" clId="{8C92D9B1-57F9-4FA7-AF99-4475187A1412}" dt="2024-01-21T17:08:43.004" v="319" actId="1076"/>
+        <pc:sldMkLst>
+          <pc:docMk/>
+          <pc:sldMk cId="1471926169" sldId="460"/>
+        </pc:sldMkLst>
+        <pc:spChg chg="mod">
+          <ac:chgData name="Mitchell Wand" userId="de9b44c55c049659" providerId="LiveId" clId="{8C92D9B1-57F9-4FA7-AF99-4475187A1412}" dt="2024-01-21T17:08:43.004" v="319" actId="1076"/>
+          <ac:spMkLst>
+            <pc:docMk/>
+            <pc:sldMk cId="1471926169" sldId="460"/>
+            <ac:spMk id="5" creationId="{F772BFE7-6CBE-12D8-B348-1A8F4B3F7277}"/>
+          </ac:spMkLst>
+        </pc:spChg>
+        <pc:spChg chg="mod">
+          <ac:chgData name="Mitchell Wand" userId="de9b44c55c049659" providerId="LiveId" clId="{8C92D9B1-57F9-4FA7-AF99-4475187A1412}" dt="2024-01-21T17:08:37.079" v="318" actId="1076"/>
+          <ac:spMkLst>
+            <pc:docMk/>
+            <pc:sldMk cId="1471926169" sldId="460"/>
+            <ac:spMk id="6" creationId="{914F242F-B894-4E59-A219-59B9174F3CB3}"/>
+          </ac:spMkLst>
+        </pc:spChg>
+      </pc:sldChg>
+      <pc:sldChg chg="modSp mod">
+        <pc:chgData name="Mitchell Wand" userId="de9b44c55c049659" providerId="LiveId" clId="{8C92D9B1-57F9-4FA7-AF99-4475187A1412}" dt="2024-01-21T17:09:32.150" v="361" actId="20577"/>
+        <pc:sldMkLst>
+          <pc:docMk/>
+          <pc:sldMk cId="3158287491" sldId="486"/>
+        </pc:sldMkLst>
+        <pc:spChg chg="mod">
+          <ac:chgData name="Mitchell Wand" userId="de9b44c55c049659" providerId="LiveId" clId="{8C92D9B1-57F9-4FA7-AF99-4475187A1412}" dt="2024-01-21T17:09:32.150" v="361" actId="20577"/>
+          <ac:spMkLst>
+            <pc:docMk/>
+            <pc:sldMk cId="3158287491" sldId="486"/>
+            <ac:spMk id="3" creationId="{AC300E2B-BFD0-4090-AFC5-FE82683F997F}"/>
+          </ac:spMkLst>
+        </pc:spChg>
+      </pc:sldChg>
+      <pc:sldChg chg="modSp mod">
+        <pc:chgData name="Mitchell Wand" userId="de9b44c55c049659" providerId="LiveId" clId="{8C92D9B1-57F9-4FA7-AF99-4475187A1412}" dt="2024-01-21T17:10:42.537" v="395" actId="20577"/>
+        <pc:sldMkLst>
+          <pc:docMk/>
+          <pc:sldMk cId="3109479661" sldId="516"/>
+        </pc:sldMkLst>
+        <pc:spChg chg="mod">
+          <ac:chgData name="Mitchell Wand" userId="de9b44c55c049659" providerId="LiveId" clId="{8C92D9B1-57F9-4FA7-AF99-4475187A1412}" dt="2024-01-21T17:10:42.537" v="395" actId="20577"/>
+          <ac:spMkLst>
+            <pc:docMk/>
+            <pc:sldMk cId="3109479661" sldId="516"/>
+            <ac:spMk id="2" creationId="{626696D1-FA45-8CD6-B51A-398E86028C11}"/>
+          </ac:spMkLst>
+        </pc:spChg>
+      </pc:sldChg>
+      <pc:sldChg chg="modSp mod">
+        <pc:chgData name="Mitchell Wand" userId="de9b44c55c049659" providerId="LiveId" clId="{8C92D9B1-57F9-4FA7-AF99-4475187A1412}" dt="2024-01-21T17:17:36.792" v="471" actId="20577"/>
+        <pc:sldMkLst>
+          <pc:docMk/>
+          <pc:sldMk cId="3617850318" sldId="517"/>
+        </pc:sldMkLst>
+        <pc:spChg chg="mod">
+          <ac:chgData name="Mitchell Wand" userId="de9b44c55c049659" providerId="LiveId" clId="{8C92D9B1-57F9-4FA7-AF99-4475187A1412}" dt="2024-01-21T17:10:52.320" v="397" actId="20577"/>
+          <ac:spMkLst>
+            <pc:docMk/>
+            <pc:sldMk cId="3617850318" sldId="517"/>
+            <ac:spMk id="2" creationId="{4CE907AB-0992-8834-1E33-EC9EE8D0CC25}"/>
+          </ac:spMkLst>
+        </pc:spChg>
+        <pc:spChg chg="mod">
+          <ac:chgData name="Mitchell Wand" userId="de9b44c55c049659" providerId="LiveId" clId="{8C92D9B1-57F9-4FA7-AF99-4475187A1412}" dt="2024-01-21T17:17:36.792" v="471" actId="20577"/>
+          <ac:spMkLst>
+            <pc:docMk/>
+            <pc:sldMk cId="3617850318" sldId="517"/>
+            <ac:spMk id="4" creationId="{2610D18C-65B3-8A1C-084E-FC89FB5A946D}"/>
+          </ac:spMkLst>
+        </pc:spChg>
+      </pc:sldChg>
+      <pc:sldChg chg="modSp mod">
+        <pc:chgData name="Mitchell Wand" userId="de9b44c55c049659" providerId="LiveId" clId="{8C92D9B1-57F9-4FA7-AF99-4475187A1412}" dt="2024-01-21T17:11:30.863" v="439" actId="20577"/>
+        <pc:sldMkLst>
+          <pc:docMk/>
+          <pc:sldMk cId="3043335516" sldId="522"/>
+        </pc:sldMkLst>
+        <pc:spChg chg="mod">
+          <ac:chgData name="Mitchell Wand" userId="de9b44c55c049659" providerId="LiveId" clId="{8C92D9B1-57F9-4FA7-AF99-4475187A1412}" dt="2024-01-21T17:11:30.863" v="439" actId="20577"/>
+          <ac:spMkLst>
+            <pc:docMk/>
+            <pc:sldMk cId="3043335516" sldId="522"/>
+            <ac:spMk id="3" creationId="{AC300E2B-BFD0-4090-AFC5-FE82683F997F}"/>
           </ac:spMkLst>
         </pc:spChg>
       </pc:sldChg>
@@ -4832,7 +5000,7 @@
           <a:p>
             <a:fld id="{7C7E5181-6CF5-45F7-A87A-E0E0B1FD7549}" type="datetimeFigureOut">
               <a:rPr lang="en-US" smtClean="0"/>
-              <a:t>1/12/2024</a:t>
+              <a:t>1/21/2024</a:t>
             </a:fld>
             <a:endParaRPr lang="en-US"/>
           </a:p>
@@ -7853,7 +8021,7 @@
           <a:p>
             <a:r>
               <a:rPr lang="en-US" dirty="0"/>
-              <a:t>One last pattern: The Singleton Pattern.</a:t>
+              <a:t>Let's get back to clocks for one last pattern: The Singleton Pattern.</a:t>
             </a:r>
           </a:p>
           <a:p>
@@ -9321,7 +9489,7 @@
           <a:p>
             <a:r>
               <a:rPr lang="en-US" dirty="0"/>
-              <a:t>The first solution is to have the consumer ask the producer for the data.   For this to work, the consumer needs to know the identity of the producer, and the producer has to provide a method that the consumer can call to ask for the data. </a:t>
+              <a:t>The first solution is to have the consumer ask the producer for the data.   This is so simple it hardly counts as a pattern-- it's what you likely do all the time.  But let's look at it a little more closely.</a:t>
             </a:r>
           </a:p>
           <a:p>
@@ -9330,7 +9498,25 @@
           <a:p>
             <a:r>
               <a:rPr lang="en-US" dirty="0"/>
-              <a:t>Here’s some skeleton code for that.  Notice that the Consumer takes a Producer as parameter to its constructor, and the producer has a method </a:t>
+              <a:t>Here’s some skeleton code for this, just to identify all the parts.  We have a Producer class that produces data, and a Consumer class that wants to use that data.</a:t>
+            </a:r>
+          </a:p>
+          <a:p>
+            <a:endParaRPr lang="en-US" dirty="0"/>
+          </a:p>
+          <a:p>
+            <a:r>
+              <a:rPr lang="en-US" dirty="0"/>
+              <a:t>For this to work, the consumer needs to know the identity of the producer, and the producer has to provide a method that the consumer can call to ask for the data. </a:t>
+            </a:r>
+          </a:p>
+          <a:p>
+            <a:endParaRPr lang="en-US" dirty="0"/>
+          </a:p>
+          <a:p>
+            <a:r>
+              <a:rPr lang="en-US" dirty="0"/>
+              <a:t>Notice that the Consumer takes a Producer as parameter to its constructor, and the producer has a method </a:t>
             </a:r>
             <a:r>
               <a:rPr lang="en-US" dirty="0" err="1"/>
@@ -9672,7 +9858,7 @@
           <a:p>
             <a:fld id="{5D2A64DE-480B-420F-9649-4F8E696E08E0}" type="datetime1">
               <a:rPr lang="en-US" smtClean="0"/>
-              <a:t>1/12/2024</a:t>
+              <a:t>1/21/2024</a:t>
             </a:fld>
             <a:endParaRPr lang="en-US"/>
           </a:p>
@@ -9996,7 +10182,7 @@
           <a:p>
             <a:fld id="{EA476A42-A091-4468-A075-64A31BE59948}" type="datetime1">
               <a:rPr lang="en-US" smtClean="0"/>
-              <a:t>1/12/2024</a:t>
+              <a:t>1/21/2024</a:t>
             </a:fld>
             <a:endParaRPr lang="en-US"/>
           </a:p>
@@ -10194,7 +10380,7 @@
           <a:p>
             <a:fld id="{0D3616D0-8311-4107-9726-6B805E7D05BA}" type="datetime1">
               <a:rPr lang="en-US" smtClean="0"/>
-              <a:t>1/12/2024</a:t>
+              <a:t>1/21/2024</a:t>
             </a:fld>
             <a:endParaRPr lang="en-US"/>
           </a:p>
@@ -10402,7 +10588,7 @@
           <a:p>
             <a:fld id="{3BC2557A-5C88-417A-A763-5AC779462A5F}" type="datetime1">
               <a:rPr lang="en-US" smtClean="0"/>
-              <a:t>1/12/2024</a:t>
+              <a:t>1/21/2024</a:t>
             </a:fld>
             <a:endParaRPr lang="en-US"/>
           </a:p>
@@ -10926,7 +11112,7 @@
           <a:p>
             <a:fld id="{07C7BFD4-467E-4EDE-93EA-052F5B39A4E5}" type="datetime1">
               <a:rPr lang="en-US" smtClean="0"/>
-              <a:t>1/12/2024</a:t>
+              <a:t>1/21/2024</a:t>
             </a:fld>
             <a:endParaRPr lang="en-US"/>
           </a:p>
@@ -11176,7 +11362,7 @@
           <a:p>
             <a:fld id="{07C7BFD4-467E-4EDE-93EA-052F5B39A4E5}" type="datetime1">
               <a:rPr lang="en-US" smtClean="0"/>
-              <a:t>1/12/2024</a:t>
+              <a:t>1/21/2024</a:t>
             </a:fld>
             <a:endParaRPr lang="en-US"/>
           </a:p>
@@ -11364,7 +11550,7 @@
           <a:p>
             <a:fld id="{109E55A0-C911-4F03-82FC-7E5926047D46}" type="datetime1">
               <a:rPr lang="en-US" smtClean="0"/>
-              <a:t>1/12/2024</a:t>
+              <a:t>1/21/2024</a:t>
             </a:fld>
             <a:endParaRPr lang="en-US"/>
           </a:p>
@@ -11677,7 +11863,7 @@
           <a:p>
             <a:fld id="{A533CBE2-D5BE-47AC-ADC2-9CDFC1D0CF90}" type="datetime1">
               <a:rPr lang="en-US" smtClean="0"/>
-              <a:t>1/12/2024</a:t>
+              <a:t>1/21/2024</a:t>
             </a:fld>
             <a:endParaRPr lang="en-US"/>
           </a:p>
@@ -11978,7 +12164,7 @@
           <a:p>
             <a:fld id="{39B7EDB1-CE74-4951-85A2-0B01C2128E28}" type="datetime1">
               <a:rPr lang="en-US" smtClean="0"/>
-              <a:t>1/12/2024</a:t>
+              <a:t>1/21/2024</a:t>
             </a:fld>
             <a:endParaRPr lang="en-US"/>
           </a:p>
@@ -12426,7 +12612,7 @@
           <a:p>
             <a:fld id="{2BC7EB92-A5C2-4807-A9DC-9EDE6CBFB241}" type="datetime1">
               <a:rPr lang="en-US" smtClean="0"/>
-              <a:t>1/12/2024</a:t>
+              <a:t>1/21/2024</a:t>
             </a:fld>
             <a:endParaRPr lang="en-US"/>
           </a:p>
@@ -12539,7 +12725,7 @@
           <a:p>
             <a:fld id="{2B7B7EE0-7771-4CD5-9B2B-3550753A54A1}" type="datetime1">
               <a:rPr lang="en-US" smtClean="0"/>
-              <a:t>1/12/2024</a:t>
+              <a:t>1/21/2024</a:t>
             </a:fld>
             <a:endParaRPr lang="en-US"/>
           </a:p>
@@ -12850,7 +13036,7 @@
           <a:p>
             <a:fld id="{F8B318B3-0E87-4416-A9B8-D891968C2727}" type="datetime1">
               <a:rPr lang="en-US" smtClean="0"/>
-              <a:t>1/12/2024</a:t>
+              <a:t>1/21/2024</a:t>
             </a:fld>
             <a:endParaRPr lang="en-US"/>
           </a:p>
@@ -13091,7 +13277,7 @@
           <a:p>
             <a:fld id="{54D997E8-DDEE-43F1-8D9B-F8A1E11DE488}" type="datetime1">
               <a:rPr lang="en-US" smtClean="0"/>
-              <a:t>1/12/2024</a:t>
+              <a:t>1/21/2024</a:t>
             </a:fld>
             <a:endParaRPr lang="en-US"/>
           </a:p>
@@ -13755,7 +13941,15 @@
           <a:p>
             <a:r>
               <a:rPr lang="en-US" sz="3600" dirty="0"/>
-              <a:t>Pattern 1: consumer asks producer </a:t>
+              <a:t>Pattern </a:t>
+            </a:r>
+            <a:r>
+              <a:rPr lang="en-US" dirty="0"/>
+              <a:t>1</a:t>
+            </a:r>
+            <a:r>
+              <a:rPr lang="en-US" sz="3600" dirty="0"/>
+              <a:t>: consumer asks producer </a:t>
             </a:r>
             <a:br>
               <a:rPr lang="en-US" sz="3600" dirty="0"/>
@@ -15408,7 +15602,7 @@
         </p:nvSpPr>
         <p:spPr>
           <a:xfrm>
-            <a:off x="193110" y="1343816"/>
+            <a:off x="297613" y="1570852"/>
             <a:ext cx="8507829" cy="3416320"/>
           </a:xfrm>
           <a:prstGeom prst="rect">
@@ -16350,7 +16544,7 @@
         </p:nvSpPr>
         <p:spPr>
           <a:xfrm>
-            <a:off x="5963886" y="1870828"/>
+            <a:off x="5859383" y="2578238"/>
             <a:ext cx="6945627" cy="3416320"/>
           </a:xfrm>
           <a:prstGeom prst="rect">
@@ -23309,6 +23503,17 @@
                 </a:solidFill>
               </a:rPr>
               <a:t>Explain and give an example of each of the following:</a:t>
+            </a:r>
+          </a:p>
+          <a:p>
+            <a:pPr lvl="2"/>
+            <a:r>
+              <a:rPr lang="en-US" dirty="0">
+                <a:solidFill>
+                  <a:srgbClr val="24292F"/>
+                </a:solidFill>
+              </a:rPr>
+              <a:t>The Data-Pull pattern</a:t>
             </a:r>
           </a:p>
           <a:p>
@@ -30015,7 +30220,7 @@
           <a:p>
             <a:r>
               <a:rPr lang="en-US" dirty="0"/>
-              <a:t>Pattern #2: The Typed Emitter Pattern</a:t>
+              <a:t>Pattern #3: The Typed Emitter Pattern</a:t>
             </a:r>
           </a:p>
         </p:txBody>
@@ -34980,7 +35185,7 @@
           <a:p>
             <a:r>
               <a:rPr lang="en-US" dirty="0"/>
-              <a:t>Pattern #3: The handler-passing pattern</a:t>
+              <a:t>Pattern #4: The handler-passing pattern</a:t>
             </a:r>
           </a:p>
         </p:txBody>
@@ -35036,7 +35241,7 @@
             </a:r>
             <a:r>
               <a:rPr lang="en-US" dirty="0"/>
-              <a:t>(not a method) to call.</a:t>
+              <a:t>to call.</a:t>
             </a:r>
           </a:p>
           <a:p>
@@ -37923,7 +38128,7 @@
           <a:p>
             <a:r>
               <a:rPr lang="en-US" dirty="0"/>
-              <a:t>Pattern #4: The Singleton Pattern</a:t>
+              <a:t>Pattern #5: The Singleton Pattern</a:t>
             </a:r>
           </a:p>
         </p:txBody>
@@ -43564,15 +43769,7 @@
           <a:p>
             <a:r>
               <a:rPr lang="en-US" dirty="0"/>
-              <a:t>Now that we have come to the end </a:t>
-            </a:r>
-            <a:r>
-              <a:rPr lang="en-US"/>
-              <a:t>of this lesson, </a:t>
-            </a:r>
-            <a:r>
-              <a:rPr lang="en-US" dirty="0"/>
-              <a:t>you should be able to</a:t>
+              <a:t>Now that we have come to the end of this lesson, you should be able to</a:t>
             </a:r>
           </a:p>
           <a:p>
@@ -43604,6 +43801,17 @@
                 </a:solidFill>
               </a:rPr>
               <a:t>Explain and give an example of each of the following:</a:t>
+            </a:r>
+          </a:p>
+          <a:p>
+            <a:pPr lvl="2"/>
+            <a:r>
+              <a:rPr lang="en-US" dirty="0">
+                <a:solidFill>
+                  <a:srgbClr val="24292F"/>
+                </a:solidFill>
+              </a:rPr>
+              <a:t>The Data-Pull pattern</a:t>
             </a:r>
           </a:p>
           <a:p>
@@ -44154,6 +44362,16 @@
             <a:normAutofit/>
           </a:bodyPr>
           <a:lstStyle/>
+          <a:p>
+            <a:pPr marL="457200" indent="-457200">
+              <a:buFont typeface="+mj-lt"/>
+              <a:buAutoNum type="arabicPeriod"/>
+            </a:pPr>
+            <a:r>
+              <a:rPr lang="en-US" dirty="0"/>
+              <a:t>The Data-Pull Pattern</a:t>
+            </a:r>
+          </a:p>
           <a:p>
             <a:pPr marL="457200" indent="-457200">
               <a:buFont typeface="+mj-lt"/>

</xml_diff>